<commit_message>
update: almost finished stage select scene
</commit_message>
<xml_diff>
--- a/kikaku/taxmcneo_kikakusho.pptx
+++ b/kikaku/taxmcneo_kikakusho.pptx
@@ -5,16 +5,16 @@
     <p:sldMasterId id="2147483648" r:id="rId1"/>
   </p:sldMasterIdLst>
   <p:notesMasterIdLst>
-    <p:notesMasterId r:id="rId4"/>
+    <p:notesMasterId r:id="rId6"/>
   </p:notesMasterIdLst>
   <p:handoutMasterIdLst>
-    <p:handoutMasterId r:id="rId8"/>
+    <p:handoutMasterId r:id="rId7"/>
   </p:handoutMasterIdLst>
   <p:sldIdLst>
-    <p:sldId id="256" r:id="rId3"/>
-    <p:sldId id="259" r:id="rId5"/>
-    <p:sldId id="257" r:id="rId6"/>
-    <p:sldId id="258" r:id="rId7"/>
+    <p:sldId id="256" r:id="rId2"/>
+    <p:sldId id="259" r:id="rId3"/>
+    <p:sldId id="257" r:id="rId4"/>
+    <p:sldId id="258" r:id="rId5"/>
   </p:sldIdLst>
   <p:sldSz cx="12192000" cy="6858000"/>
   <p:notesSz cx="6858000" cy="9144000"/>
@@ -113,6 +113,14 @@
       </a:defRPr>
     </a:lvl9pPr>
   </p:defaultTextStyle>
+  <p:extLst>
+    <p:ext uri="{EFAFB233-063F-42B5-8137-9DF3F51BA10A}">
+      <p15:sldGuideLst xmlns:p15="http://schemas.microsoft.com/office/powerpoint/2012/main"/>
+    </p:ext>
+    <p:ext uri="{2D200454-40CA-4A62-9FC3-DE9A4176ACB9}">
+      <p15:notesGuideLst xmlns:p15="http://schemas.microsoft.com/office/powerpoint/2012/main"/>
+    </p:ext>
+  </p:extLst>
 </p:presentation>
 </file>
 
@@ -198,6 +206,7 @@
           <a:p>
             <a:fld id="{D7D61A3E-AC6E-4B60-95A4-C1B3371851F9}" type="datetimeFigureOut">
               <a:rPr kumimoji="1" lang="ja-JP" altLang="en-US" smtClean="0"/>
+              <a:t>2023/10/16</a:t>
             </a:fld>
             <a:endParaRPr kumimoji="1" lang="ja-JP" altLang="en-US"/>
           </a:p>
@@ -263,12 +272,18 @@
           <a:p>
             <a:fld id="{0990A3E0-14E8-4BE6-85AB-5C5385A62A44}" type="slidenum">
               <a:rPr kumimoji="1" lang="ja-JP" altLang="en-US" smtClean="0"/>
+              <a:t>‹#›</a:t>
             </a:fld>
             <a:endParaRPr kumimoji="1" lang="ja-JP" altLang="en-US"/>
           </a:p>
         </p:txBody>
       </p:sp>
     </p:spTree>
+    <p:extLst>
+      <p:ext uri="{BB962C8B-B14F-4D97-AF65-F5344CB8AC3E}">
+        <p14:creationId xmlns:p14="http://schemas.microsoft.com/office/powerpoint/2010/main" val="1"/>
+      </p:ext>
+    </p:extLst>
   </p:cSld>
   <p:clrMap bg1="lt1" tx1="dk1" bg2="lt2" tx2="dk2" accent1="accent1" accent2="accent2" accent3="accent3" accent4="accent4" accent5="accent5" accent6="accent6" hlink="hlink" folHlink="folHlink"/>
 </p:handoutMaster>
@@ -356,6 +371,7 @@
           <a:p>
             <a:fld id="{64C34F6E-DEEE-400C-92A1-19923C75B907}" type="datetimeFigureOut">
               <a:rPr kumimoji="1" lang="ja-JP" altLang="en-US" smtClean="0"/>
+              <a:t>2023/10/16</a:t>
             </a:fld>
             <a:endParaRPr kumimoji="1" lang="ja-JP" altLang="en-US"/>
           </a:p>
@@ -419,74 +435,69 @@
           <a:p>
             <a:pPr lvl="0"/>
             <a:r>
-              <a:rPr kumimoji="1" lang="ja-JP" altLang="en-US" smtClean="0"/>
+              <a:rPr kumimoji="1" lang="ja-JP" altLang="en-US"/>
               <a:t>マスター テキストの書式設定</a:t>
             </a:r>
-            <a:endParaRPr kumimoji="1" lang="ja-JP" altLang="en-US" smtClean="0"/>
           </a:p>
           <a:p>
             <a:pPr lvl="1"/>
             <a:r>
-              <a:rPr kumimoji="1" lang="ja-JP" altLang="en-US" smtClean="0"/>
+              <a:rPr kumimoji="1" lang="ja-JP" altLang="en-US"/>
               <a:t>第 </a:t>
             </a:r>
             <a:r>
-              <a:rPr kumimoji="1" lang="en-US" altLang="ja-JP" smtClean="0"/>
+              <a:rPr kumimoji="1" lang="en-US" altLang="ja-JP"/>
               <a:t>2 </a:t>
             </a:r>
             <a:r>
-              <a:rPr kumimoji="1" lang="ja-JP" altLang="en-US" smtClean="0"/>
+              <a:rPr kumimoji="1" lang="ja-JP" altLang="en-US"/>
               <a:t>レベル</a:t>
             </a:r>
-            <a:endParaRPr kumimoji="1" lang="ja-JP" altLang="en-US" smtClean="0"/>
           </a:p>
           <a:p>
             <a:pPr lvl="2"/>
             <a:r>
-              <a:rPr kumimoji="1" lang="ja-JP" altLang="en-US" smtClean="0"/>
+              <a:rPr kumimoji="1" lang="ja-JP" altLang="en-US"/>
               <a:t>第 </a:t>
             </a:r>
             <a:r>
-              <a:rPr kumimoji="1" lang="en-US" altLang="ja-JP" smtClean="0"/>
+              <a:rPr kumimoji="1" lang="en-US" altLang="ja-JP"/>
               <a:t>3 </a:t>
             </a:r>
             <a:r>
-              <a:rPr kumimoji="1" lang="ja-JP" altLang="en-US" smtClean="0"/>
+              <a:rPr kumimoji="1" lang="ja-JP" altLang="en-US"/>
               <a:t>レベル</a:t>
             </a:r>
-            <a:endParaRPr kumimoji="1" lang="ja-JP" altLang="en-US" smtClean="0"/>
           </a:p>
           <a:p>
             <a:pPr lvl="3"/>
             <a:r>
-              <a:rPr kumimoji="1" lang="ja-JP" altLang="en-US" smtClean="0"/>
+              <a:rPr kumimoji="1" lang="ja-JP" altLang="en-US"/>
               <a:t>第 </a:t>
             </a:r>
             <a:r>
-              <a:rPr kumimoji="1" lang="en-US" altLang="ja-JP" smtClean="0"/>
+              <a:rPr kumimoji="1" lang="en-US" altLang="ja-JP"/>
               <a:t>4 </a:t>
             </a:r>
             <a:r>
-              <a:rPr kumimoji="1" lang="ja-JP" altLang="en-US" smtClean="0"/>
+              <a:rPr kumimoji="1" lang="ja-JP" altLang="en-US"/>
               <a:t>レベル</a:t>
             </a:r>
-            <a:endParaRPr kumimoji="1" lang="ja-JP" altLang="en-US" smtClean="0"/>
           </a:p>
           <a:p>
             <a:pPr lvl="4"/>
             <a:r>
-              <a:rPr kumimoji="1" lang="ja-JP" altLang="en-US" smtClean="0"/>
+              <a:rPr kumimoji="1" lang="ja-JP" altLang="en-US"/>
               <a:t>第 </a:t>
             </a:r>
             <a:r>
-              <a:rPr kumimoji="1" lang="en-US" altLang="ja-JP" smtClean="0"/>
+              <a:rPr kumimoji="1" lang="en-US" altLang="ja-JP"/>
               <a:t>5 </a:t>
             </a:r>
             <a:r>
-              <a:rPr kumimoji="1" lang="ja-JP" altLang="en-US" smtClean="0"/>
+              <a:rPr kumimoji="1" lang="ja-JP" altLang="en-US"/>
               <a:t>レベル</a:t>
             </a:r>
-            <a:endParaRPr kumimoji="1" lang="ja-JP" altLang="en-US"/>
           </a:p>
         </p:txBody>
       </p:sp>
@@ -550,6 +561,7 @@
           <a:p>
             <a:fld id="{8D23A1E1-D89E-4D9F-ACC7-724568FAD569}" type="slidenum">
               <a:rPr kumimoji="1" lang="ja-JP" altLang="en-US" smtClean="0"/>
+              <a:t>‹#›</a:t>
             </a:fld>
             <a:endParaRPr kumimoji="1" lang="ja-JP" altLang="en-US"/>
           </a:p>
@@ -718,6 +730,7 @@
           <a:p>
             <a:fld id="{8D23A1E1-D89E-4D9F-ACC7-724568FAD569}" type="slidenum">
               <a:rPr kumimoji="1" lang="ja-JP" altLang="en-US" smtClean="0"/>
+              <a:t>1</a:t>
             </a:fld>
             <a:endParaRPr kumimoji="1" lang="ja-JP" altLang="en-US"/>
           </a:p>
@@ -773,10 +786,9 @@
           </a:lstStyle>
           <a:p>
             <a:r>
-              <a:rPr kumimoji="1" lang="ja-JP" altLang="en-US" smtClean="0"/>
+              <a:rPr kumimoji="1" lang="ja-JP" altLang="en-US"/>
               <a:t>マスター タイトルの書式設定</a:t>
             </a:r>
-            <a:endParaRPr kumimoji="1" lang="ja-JP" altLang="en-US"/>
           </a:p>
         </p:txBody>
       </p:sp>
@@ -838,10 +850,9 @@
           </a:lstStyle>
           <a:p>
             <a:r>
-              <a:rPr kumimoji="1" lang="ja-JP" altLang="en-US" smtClean="0"/>
+              <a:rPr kumimoji="1" lang="ja-JP" altLang="en-US"/>
               <a:t>マスター サブタイトルの書式設定</a:t>
             </a:r>
-            <a:endParaRPr kumimoji="1" lang="ja-JP" altLang="en-US"/>
           </a:p>
         </p:txBody>
       </p:sp>
@@ -862,6 +873,7 @@
           <a:p>
             <a:fld id="{14C5B98E-B881-44C6-965E-C4CBF4BD5DE0}" type="datetimeFigureOut">
               <a:rPr kumimoji="1" lang="ja-JP" altLang="en-US" smtClean="0"/>
+              <a:t>2023/10/16</a:t>
             </a:fld>
             <a:endParaRPr kumimoji="1" lang="ja-JP" altLang="en-US"/>
           </a:p>
@@ -903,6 +915,7 @@
           <a:p>
             <a:fld id="{B261B85B-3F11-4807-BF0A-089ABAB91E6D}" type="slidenum">
               <a:rPr kumimoji="1" lang="ja-JP" altLang="en-US" smtClean="0"/>
+              <a:t>‹#›</a:t>
             </a:fld>
             <a:endParaRPr kumimoji="1" lang="ja-JP" altLang="en-US"/>
           </a:p>
@@ -913,13 +926,6 @@
   <p:clrMapOvr>
     <a:masterClrMapping/>
   </p:clrMapOvr>
-  <p:timing>
-    <p:tnLst>
-      <p:par>
-        <p:cTn id="1" dur="indefinite" restart="never" nodeType="tmRoot"/>
-      </p:par>
-    </p:tnLst>
-  </p:timing>
 </p:sldLayout>
 </file>
 
@@ -957,6 +963,7 @@
           <a:p>
             <a:fld id="{760FBDFE-C587-4B4C-A407-44438C67B59E}" type="datetimeFigureOut">
               <a:rPr lang="en-US" smtClean="0"/>
+              <a:t>10/16/2023</a:t>
             </a:fld>
             <a:endParaRPr lang="en-US"/>
           </a:p>
@@ -981,7 +988,6 @@
               <a:rPr lang="en-US"/>
               <a:t>フッター</a:t>
             </a:r>
-            <a:endParaRPr lang="en-US"/>
           </a:p>
         </p:txBody>
       </p:sp>
@@ -1002,6 +1008,7 @@
           <a:p>
             <a:fld id="{49AE70B2-8BF9-45C0-BB95-33D1B9D3A854}" type="slidenum">
               <a:rPr lang="en-US" smtClean="0"/>
+              <a:t>‹#›</a:t>
             </a:fld>
             <a:endParaRPr lang="en-US"/>
           </a:p>
@@ -1029,74 +1036,69 @@
           <a:p>
             <a:pPr lvl="0"/>
             <a:r>
-              <a:rPr kumimoji="1" lang="ja-JP" altLang="en-US" dirty="0" smtClean="0"/>
+              <a:rPr kumimoji="1" lang="ja-JP" altLang="en-US" dirty="0"/>
               <a:t>マスター テキストの書式設定</a:t>
             </a:r>
-            <a:endParaRPr kumimoji="1" lang="ja-JP" altLang="en-US" dirty="0" smtClean="0"/>
           </a:p>
           <a:p>
             <a:pPr lvl="1"/>
             <a:r>
-              <a:rPr kumimoji="1" lang="ja-JP" altLang="en-US" dirty="0" smtClean="0"/>
+              <a:rPr kumimoji="1" lang="ja-JP" altLang="en-US" dirty="0"/>
               <a:t>第 </a:t>
             </a:r>
             <a:r>
-              <a:rPr kumimoji="1" lang="en-US" altLang="ja-JP" dirty="0" smtClean="0"/>
+              <a:rPr kumimoji="1" lang="en-US" altLang="ja-JP" dirty="0"/>
               <a:t>2 </a:t>
             </a:r>
             <a:r>
-              <a:rPr kumimoji="1" lang="ja-JP" altLang="en-US" dirty="0" smtClean="0"/>
+              <a:rPr kumimoji="1" lang="ja-JP" altLang="en-US" dirty="0"/>
               <a:t>レベル</a:t>
             </a:r>
-            <a:endParaRPr kumimoji="1" lang="ja-JP" altLang="en-US" dirty="0" smtClean="0"/>
           </a:p>
           <a:p>
             <a:pPr lvl="2"/>
             <a:r>
-              <a:rPr kumimoji="1" lang="ja-JP" altLang="en-US" dirty="0" smtClean="0"/>
+              <a:rPr kumimoji="1" lang="ja-JP" altLang="en-US" dirty="0"/>
               <a:t>第 </a:t>
             </a:r>
             <a:r>
-              <a:rPr kumimoji="1" lang="en-US" altLang="ja-JP" dirty="0" smtClean="0"/>
+              <a:rPr kumimoji="1" lang="en-US" altLang="ja-JP" dirty="0"/>
               <a:t>3 </a:t>
             </a:r>
             <a:r>
-              <a:rPr kumimoji="1" lang="ja-JP" altLang="en-US" dirty="0" smtClean="0"/>
+              <a:rPr kumimoji="1" lang="ja-JP" altLang="en-US" dirty="0"/>
               <a:t>レベル</a:t>
             </a:r>
-            <a:endParaRPr kumimoji="1" lang="ja-JP" altLang="en-US" dirty="0" smtClean="0"/>
           </a:p>
           <a:p>
             <a:pPr lvl="3"/>
             <a:r>
-              <a:rPr kumimoji="1" lang="ja-JP" altLang="en-US" dirty="0" smtClean="0"/>
+              <a:rPr kumimoji="1" lang="ja-JP" altLang="en-US" dirty="0"/>
               <a:t>第 </a:t>
             </a:r>
             <a:r>
-              <a:rPr kumimoji="1" lang="en-US" altLang="ja-JP" dirty="0" smtClean="0"/>
+              <a:rPr kumimoji="1" lang="en-US" altLang="ja-JP" dirty="0"/>
               <a:t>4 </a:t>
             </a:r>
             <a:r>
-              <a:rPr kumimoji="1" lang="ja-JP" altLang="en-US" dirty="0" smtClean="0"/>
+              <a:rPr kumimoji="1" lang="ja-JP" altLang="en-US" dirty="0"/>
               <a:t>レベル</a:t>
             </a:r>
-            <a:endParaRPr kumimoji="1" lang="ja-JP" altLang="en-US" dirty="0" smtClean="0"/>
           </a:p>
           <a:p>
             <a:pPr lvl="4"/>
             <a:r>
-              <a:rPr kumimoji="1" lang="ja-JP" altLang="en-US" dirty="0" smtClean="0"/>
+              <a:rPr kumimoji="1" lang="ja-JP" altLang="en-US" dirty="0"/>
               <a:t>第 </a:t>
             </a:r>
             <a:r>
-              <a:rPr kumimoji="1" lang="en-US" altLang="ja-JP" dirty="0" smtClean="0"/>
+              <a:rPr kumimoji="1" lang="en-US" altLang="ja-JP" dirty="0"/>
               <a:t>5 </a:t>
             </a:r>
             <a:r>
-              <a:rPr kumimoji="1" lang="ja-JP" altLang="en-US" dirty="0" smtClean="0"/>
+              <a:rPr kumimoji="1" lang="ja-JP" altLang="en-US" dirty="0"/>
               <a:t>レベル</a:t>
             </a:r>
-            <a:endParaRPr kumimoji="1" lang="ja-JP" altLang="en-US" dirty="0"/>
           </a:p>
         </p:txBody>
       </p:sp>
@@ -1105,13 +1107,6 @@
   <p:clrMapOvr>
     <a:masterClrMapping/>
   </p:clrMapOvr>
-  <p:timing>
-    <p:tnLst>
-      <p:par>
-        <p:cTn id="1" dur="indefinite" restart="never" nodeType="tmRoot"/>
-      </p:par>
-    </p:tnLst>
-  </p:timing>
 </p:sldLayout>
 </file>
 
@@ -1148,10 +1143,9 @@
           <a:lstStyle/>
           <a:p>
             <a:r>
-              <a:rPr kumimoji="1" lang="ja-JP" altLang="en-US" smtClean="0"/>
+              <a:rPr kumimoji="1" lang="ja-JP" altLang="en-US"/>
               <a:t>マスター タイトルの書式設定</a:t>
             </a:r>
-            <a:endParaRPr kumimoji="1" lang="ja-JP" altLang="en-US"/>
           </a:p>
         </p:txBody>
       </p:sp>
@@ -1172,74 +1166,69 @@
           <a:p>
             <a:pPr lvl="0"/>
             <a:r>
-              <a:rPr kumimoji="1" lang="ja-JP" altLang="en-US" smtClean="0"/>
+              <a:rPr kumimoji="1" lang="ja-JP" altLang="en-US"/>
               <a:t>マスター テキストの書式設定</a:t>
             </a:r>
-            <a:endParaRPr kumimoji="1" lang="ja-JP" altLang="en-US" smtClean="0"/>
           </a:p>
           <a:p>
             <a:pPr lvl="1"/>
             <a:r>
-              <a:rPr kumimoji="1" lang="ja-JP" altLang="en-US" smtClean="0"/>
+              <a:rPr kumimoji="1" lang="ja-JP" altLang="en-US"/>
               <a:t>第 </a:t>
             </a:r>
             <a:r>
-              <a:rPr kumimoji="1" lang="en-US" altLang="ja-JP" smtClean="0"/>
+              <a:rPr kumimoji="1" lang="en-US" altLang="ja-JP"/>
               <a:t>2 </a:t>
             </a:r>
             <a:r>
-              <a:rPr kumimoji="1" lang="ja-JP" altLang="en-US" smtClean="0"/>
+              <a:rPr kumimoji="1" lang="ja-JP" altLang="en-US"/>
               <a:t>レベル</a:t>
             </a:r>
-            <a:endParaRPr kumimoji="1" lang="ja-JP" altLang="en-US" smtClean="0"/>
           </a:p>
           <a:p>
             <a:pPr lvl="2"/>
             <a:r>
-              <a:rPr kumimoji="1" lang="ja-JP" altLang="en-US" smtClean="0"/>
+              <a:rPr kumimoji="1" lang="ja-JP" altLang="en-US"/>
               <a:t>第 </a:t>
             </a:r>
             <a:r>
-              <a:rPr kumimoji="1" lang="en-US" altLang="ja-JP" smtClean="0"/>
+              <a:rPr kumimoji="1" lang="en-US" altLang="ja-JP"/>
               <a:t>3 </a:t>
             </a:r>
             <a:r>
-              <a:rPr kumimoji="1" lang="ja-JP" altLang="en-US" smtClean="0"/>
+              <a:rPr kumimoji="1" lang="ja-JP" altLang="en-US"/>
               <a:t>レベル</a:t>
             </a:r>
-            <a:endParaRPr kumimoji="1" lang="ja-JP" altLang="en-US" smtClean="0"/>
           </a:p>
           <a:p>
             <a:pPr lvl="3"/>
             <a:r>
-              <a:rPr kumimoji="1" lang="ja-JP" altLang="en-US" smtClean="0"/>
+              <a:rPr kumimoji="1" lang="ja-JP" altLang="en-US"/>
               <a:t>第 </a:t>
             </a:r>
             <a:r>
-              <a:rPr kumimoji="1" lang="en-US" altLang="ja-JP" smtClean="0"/>
+              <a:rPr kumimoji="1" lang="en-US" altLang="ja-JP"/>
               <a:t>4 </a:t>
             </a:r>
             <a:r>
-              <a:rPr kumimoji="1" lang="ja-JP" altLang="en-US" smtClean="0"/>
+              <a:rPr kumimoji="1" lang="ja-JP" altLang="en-US"/>
               <a:t>レベル</a:t>
             </a:r>
-            <a:endParaRPr kumimoji="1" lang="ja-JP" altLang="en-US" smtClean="0"/>
           </a:p>
           <a:p>
             <a:pPr lvl="4"/>
             <a:r>
-              <a:rPr kumimoji="1" lang="ja-JP" altLang="en-US" smtClean="0"/>
+              <a:rPr kumimoji="1" lang="ja-JP" altLang="en-US"/>
               <a:t>第 </a:t>
             </a:r>
             <a:r>
-              <a:rPr kumimoji="1" lang="en-US" altLang="ja-JP" smtClean="0"/>
+              <a:rPr kumimoji="1" lang="en-US" altLang="ja-JP"/>
               <a:t>5 </a:t>
             </a:r>
             <a:r>
-              <a:rPr kumimoji="1" lang="ja-JP" altLang="en-US" smtClean="0"/>
+              <a:rPr kumimoji="1" lang="ja-JP" altLang="en-US"/>
               <a:t>レベル</a:t>
             </a:r>
-            <a:endParaRPr kumimoji="1" lang="ja-JP" altLang="en-US"/>
           </a:p>
         </p:txBody>
       </p:sp>
@@ -1260,6 +1249,7 @@
           <a:p>
             <a:fld id="{14C5B98E-B881-44C6-965E-C4CBF4BD5DE0}" type="datetimeFigureOut">
               <a:rPr kumimoji="1" lang="ja-JP" altLang="en-US" smtClean="0"/>
+              <a:t>2023/10/16</a:t>
             </a:fld>
             <a:endParaRPr kumimoji="1" lang="ja-JP" altLang="en-US"/>
           </a:p>
@@ -1301,6 +1291,7 @@
           <a:p>
             <a:fld id="{B261B85B-3F11-4807-BF0A-089ABAB91E6D}" type="slidenum">
               <a:rPr kumimoji="1" lang="ja-JP" altLang="en-US" smtClean="0"/>
+              <a:t>‹#›</a:t>
             </a:fld>
             <a:endParaRPr kumimoji="1" lang="ja-JP" altLang="en-US"/>
           </a:p>
@@ -1356,10 +1347,9 @@
           </a:lstStyle>
           <a:p>
             <a:r>
-              <a:rPr kumimoji="1" lang="ja-JP" altLang="en-US" smtClean="0"/>
+              <a:rPr kumimoji="1" lang="ja-JP" altLang="en-US"/>
               <a:t>マスター タイトルの書式設定</a:t>
             </a:r>
-            <a:endParaRPr kumimoji="1" lang="ja-JP" altLang="en-US"/>
           </a:p>
         </p:txBody>
       </p:sp>
@@ -1476,10 +1466,9 @@
           <a:p>
             <a:pPr lvl="0"/>
             <a:r>
-              <a:rPr kumimoji="1" lang="ja-JP" altLang="en-US" smtClean="0"/>
+              <a:rPr kumimoji="1" lang="ja-JP" altLang="en-US"/>
               <a:t>マスター テキストの書式設定</a:t>
             </a:r>
-            <a:endParaRPr kumimoji="1" lang="ja-JP" altLang="en-US" smtClean="0"/>
           </a:p>
         </p:txBody>
       </p:sp>
@@ -1500,6 +1489,7 @@
           <a:p>
             <a:fld id="{14C5B98E-B881-44C6-965E-C4CBF4BD5DE0}" type="datetimeFigureOut">
               <a:rPr kumimoji="1" lang="ja-JP" altLang="en-US" smtClean="0"/>
+              <a:t>2023/10/16</a:t>
             </a:fld>
             <a:endParaRPr kumimoji="1" lang="ja-JP" altLang="en-US"/>
           </a:p>
@@ -1541,6 +1531,7 @@
           <a:p>
             <a:fld id="{B261B85B-3F11-4807-BF0A-089ABAB91E6D}" type="slidenum">
               <a:rPr kumimoji="1" lang="ja-JP" altLang="en-US" smtClean="0"/>
+              <a:t>‹#›</a:t>
             </a:fld>
             <a:endParaRPr kumimoji="1" lang="ja-JP" altLang="en-US"/>
           </a:p>
@@ -1587,10 +1578,9 @@
           <a:lstStyle/>
           <a:p>
             <a:r>
-              <a:rPr kumimoji="1" lang="ja-JP" altLang="en-US" smtClean="0"/>
+              <a:rPr kumimoji="1" lang="ja-JP" altLang="en-US"/>
               <a:t>マスター タイトルの書式設定</a:t>
             </a:r>
-            <a:endParaRPr kumimoji="1" lang="ja-JP" altLang="en-US"/>
           </a:p>
         </p:txBody>
       </p:sp>
@@ -1616,74 +1606,69 @@
           <a:p>
             <a:pPr lvl="0"/>
             <a:r>
-              <a:rPr kumimoji="1" lang="ja-JP" altLang="en-US" smtClean="0"/>
+              <a:rPr kumimoji="1" lang="ja-JP" altLang="en-US"/>
               <a:t>マスター テキストの書式設定</a:t>
             </a:r>
-            <a:endParaRPr kumimoji="1" lang="ja-JP" altLang="en-US" smtClean="0"/>
           </a:p>
           <a:p>
             <a:pPr lvl="1"/>
             <a:r>
-              <a:rPr kumimoji="1" lang="ja-JP" altLang="en-US" smtClean="0"/>
+              <a:rPr kumimoji="1" lang="ja-JP" altLang="en-US"/>
               <a:t>第 </a:t>
             </a:r>
             <a:r>
-              <a:rPr kumimoji="1" lang="en-US" altLang="ja-JP" smtClean="0"/>
+              <a:rPr kumimoji="1" lang="en-US" altLang="ja-JP"/>
               <a:t>2 </a:t>
             </a:r>
             <a:r>
-              <a:rPr kumimoji="1" lang="ja-JP" altLang="en-US" smtClean="0"/>
+              <a:rPr kumimoji="1" lang="ja-JP" altLang="en-US"/>
               <a:t>レベル</a:t>
             </a:r>
-            <a:endParaRPr kumimoji="1" lang="ja-JP" altLang="en-US" smtClean="0"/>
           </a:p>
           <a:p>
             <a:pPr lvl="2"/>
             <a:r>
-              <a:rPr kumimoji="1" lang="ja-JP" altLang="en-US" smtClean="0"/>
+              <a:rPr kumimoji="1" lang="ja-JP" altLang="en-US"/>
               <a:t>第 </a:t>
             </a:r>
             <a:r>
-              <a:rPr kumimoji="1" lang="en-US" altLang="ja-JP" smtClean="0"/>
+              <a:rPr kumimoji="1" lang="en-US" altLang="ja-JP"/>
               <a:t>3 </a:t>
             </a:r>
             <a:r>
-              <a:rPr kumimoji="1" lang="ja-JP" altLang="en-US" smtClean="0"/>
+              <a:rPr kumimoji="1" lang="ja-JP" altLang="en-US"/>
               <a:t>レベル</a:t>
             </a:r>
-            <a:endParaRPr kumimoji="1" lang="ja-JP" altLang="en-US" smtClean="0"/>
           </a:p>
           <a:p>
             <a:pPr lvl="3"/>
             <a:r>
-              <a:rPr kumimoji="1" lang="ja-JP" altLang="en-US" smtClean="0"/>
+              <a:rPr kumimoji="1" lang="ja-JP" altLang="en-US"/>
               <a:t>第 </a:t>
             </a:r>
             <a:r>
-              <a:rPr kumimoji="1" lang="en-US" altLang="ja-JP" smtClean="0"/>
+              <a:rPr kumimoji="1" lang="en-US" altLang="ja-JP"/>
               <a:t>4 </a:t>
             </a:r>
             <a:r>
-              <a:rPr kumimoji="1" lang="ja-JP" altLang="en-US" smtClean="0"/>
+              <a:rPr kumimoji="1" lang="ja-JP" altLang="en-US"/>
               <a:t>レベル</a:t>
             </a:r>
-            <a:endParaRPr kumimoji="1" lang="ja-JP" altLang="en-US" smtClean="0"/>
           </a:p>
           <a:p>
             <a:pPr lvl="4"/>
             <a:r>
-              <a:rPr kumimoji="1" lang="ja-JP" altLang="en-US" smtClean="0"/>
+              <a:rPr kumimoji="1" lang="ja-JP" altLang="en-US"/>
               <a:t>第 </a:t>
             </a:r>
             <a:r>
-              <a:rPr kumimoji="1" lang="en-US" altLang="ja-JP" smtClean="0"/>
+              <a:rPr kumimoji="1" lang="en-US" altLang="ja-JP"/>
               <a:t>5 </a:t>
             </a:r>
             <a:r>
-              <a:rPr kumimoji="1" lang="ja-JP" altLang="en-US" smtClean="0"/>
+              <a:rPr kumimoji="1" lang="ja-JP" altLang="en-US"/>
               <a:t>レベル</a:t>
             </a:r>
-            <a:endParaRPr kumimoji="1" lang="ja-JP" altLang="en-US"/>
           </a:p>
         </p:txBody>
       </p:sp>
@@ -1709,74 +1694,69 @@
           <a:p>
             <a:pPr lvl="0"/>
             <a:r>
-              <a:rPr kumimoji="1" lang="ja-JP" altLang="en-US" smtClean="0"/>
+              <a:rPr kumimoji="1" lang="ja-JP" altLang="en-US"/>
               <a:t>マスター テキストの書式設定</a:t>
             </a:r>
-            <a:endParaRPr kumimoji="1" lang="ja-JP" altLang="en-US" smtClean="0"/>
           </a:p>
           <a:p>
             <a:pPr lvl="1"/>
             <a:r>
-              <a:rPr kumimoji="1" lang="ja-JP" altLang="en-US" smtClean="0"/>
+              <a:rPr kumimoji="1" lang="ja-JP" altLang="en-US"/>
               <a:t>第 </a:t>
             </a:r>
             <a:r>
-              <a:rPr kumimoji="1" lang="en-US" altLang="ja-JP" smtClean="0"/>
+              <a:rPr kumimoji="1" lang="en-US" altLang="ja-JP"/>
               <a:t>2 </a:t>
             </a:r>
             <a:r>
-              <a:rPr kumimoji="1" lang="ja-JP" altLang="en-US" smtClean="0"/>
+              <a:rPr kumimoji="1" lang="ja-JP" altLang="en-US"/>
               <a:t>レベル</a:t>
             </a:r>
-            <a:endParaRPr kumimoji="1" lang="ja-JP" altLang="en-US" smtClean="0"/>
           </a:p>
           <a:p>
             <a:pPr lvl="2"/>
             <a:r>
-              <a:rPr kumimoji="1" lang="ja-JP" altLang="en-US" smtClean="0"/>
+              <a:rPr kumimoji="1" lang="ja-JP" altLang="en-US"/>
               <a:t>第 </a:t>
             </a:r>
             <a:r>
-              <a:rPr kumimoji="1" lang="en-US" altLang="ja-JP" smtClean="0"/>
+              <a:rPr kumimoji="1" lang="en-US" altLang="ja-JP"/>
               <a:t>3 </a:t>
             </a:r>
             <a:r>
-              <a:rPr kumimoji="1" lang="ja-JP" altLang="en-US" smtClean="0"/>
+              <a:rPr kumimoji="1" lang="ja-JP" altLang="en-US"/>
               <a:t>レベル</a:t>
             </a:r>
-            <a:endParaRPr kumimoji="1" lang="ja-JP" altLang="en-US" smtClean="0"/>
           </a:p>
           <a:p>
             <a:pPr lvl="3"/>
             <a:r>
-              <a:rPr kumimoji="1" lang="ja-JP" altLang="en-US" smtClean="0"/>
+              <a:rPr kumimoji="1" lang="ja-JP" altLang="en-US"/>
               <a:t>第 </a:t>
             </a:r>
             <a:r>
-              <a:rPr kumimoji="1" lang="en-US" altLang="ja-JP" smtClean="0"/>
+              <a:rPr kumimoji="1" lang="en-US" altLang="ja-JP"/>
               <a:t>4 </a:t>
             </a:r>
             <a:r>
-              <a:rPr kumimoji="1" lang="ja-JP" altLang="en-US" smtClean="0"/>
+              <a:rPr kumimoji="1" lang="ja-JP" altLang="en-US"/>
               <a:t>レベル</a:t>
             </a:r>
-            <a:endParaRPr kumimoji="1" lang="ja-JP" altLang="en-US" smtClean="0"/>
           </a:p>
           <a:p>
             <a:pPr lvl="4"/>
             <a:r>
-              <a:rPr kumimoji="1" lang="ja-JP" altLang="en-US" smtClean="0"/>
+              <a:rPr kumimoji="1" lang="ja-JP" altLang="en-US"/>
               <a:t>第 </a:t>
             </a:r>
             <a:r>
-              <a:rPr kumimoji="1" lang="en-US" altLang="ja-JP" smtClean="0"/>
+              <a:rPr kumimoji="1" lang="en-US" altLang="ja-JP"/>
               <a:t>5 </a:t>
             </a:r>
             <a:r>
-              <a:rPr kumimoji="1" lang="ja-JP" altLang="en-US" smtClean="0"/>
+              <a:rPr kumimoji="1" lang="ja-JP" altLang="en-US"/>
               <a:t>レベル</a:t>
             </a:r>
-            <a:endParaRPr kumimoji="1" lang="ja-JP" altLang="en-US"/>
           </a:p>
         </p:txBody>
       </p:sp>
@@ -1797,6 +1777,7 @@
           <a:p>
             <a:fld id="{14C5B98E-B881-44C6-965E-C4CBF4BD5DE0}" type="datetimeFigureOut">
               <a:rPr kumimoji="1" lang="ja-JP" altLang="en-US" smtClean="0"/>
+              <a:t>2023/10/16</a:t>
             </a:fld>
             <a:endParaRPr kumimoji="1" lang="ja-JP" altLang="en-US"/>
           </a:p>
@@ -1838,6 +1819,7 @@
           <a:p>
             <a:fld id="{B261B85B-3F11-4807-BF0A-089ABAB91E6D}" type="slidenum">
               <a:rPr kumimoji="1" lang="ja-JP" altLang="en-US" smtClean="0"/>
+              <a:t>‹#›</a:t>
             </a:fld>
             <a:endParaRPr kumimoji="1" lang="ja-JP" altLang="en-US"/>
           </a:p>
@@ -1889,10 +1871,9 @@
           <a:lstStyle/>
           <a:p>
             <a:r>
-              <a:rPr kumimoji="1" lang="ja-JP" altLang="en-US" smtClean="0"/>
+              <a:rPr kumimoji="1" lang="ja-JP" altLang="en-US"/>
               <a:t>マスター タイトルの書式設定</a:t>
             </a:r>
-            <a:endParaRPr kumimoji="1" lang="ja-JP" altLang="en-US"/>
           </a:p>
         </p:txBody>
       </p:sp>
@@ -1955,10 +1936,9 @@
           <a:p>
             <a:pPr lvl="0"/>
             <a:r>
-              <a:rPr kumimoji="1" lang="ja-JP" altLang="en-US" smtClean="0"/>
+              <a:rPr kumimoji="1" lang="ja-JP" altLang="en-US"/>
               <a:t>マスター テキストの書式設定</a:t>
             </a:r>
-            <a:endParaRPr kumimoji="1" lang="ja-JP" altLang="en-US" smtClean="0"/>
           </a:p>
         </p:txBody>
       </p:sp>
@@ -1984,74 +1964,69 @@
           <a:p>
             <a:pPr lvl="0"/>
             <a:r>
-              <a:rPr kumimoji="1" lang="ja-JP" altLang="en-US" smtClean="0"/>
+              <a:rPr kumimoji="1" lang="ja-JP" altLang="en-US"/>
               <a:t>マスター テキストの書式設定</a:t>
             </a:r>
-            <a:endParaRPr kumimoji="1" lang="ja-JP" altLang="en-US" smtClean="0"/>
           </a:p>
           <a:p>
             <a:pPr lvl="1"/>
             <a:r>
-              <a:rPr kumimoji="1" lang="ja-JP" altLang="en-US" smtClean="0"/>
+              <a:rPr kumimoji="1" lang="ja-JP" altLang="en-US"/>
               <a:t>第 </a:t>
             </a:r>
             <a:r>
-              <a:rPr kumimoji="1" lang="en-US" altLang="ja-JP" smtClean="0"/>
+              <a:rPr kumimoji="1" lang="en-US" altLang="ja-JP"/>
               <a:t>2 </a:t>
             </a:r>
             <a:r>
-              <a:rPr kumimoji="1" lang="ja-JP" altLang="en-US" smtClean="0"/>
+              <a:rPr kumimoji="1" lang="ja-JP" altLang="en-US"/>
               <a:t>レベル</a:t>
             </a:r>
-            <a:endParaRPr kumimoji="1" lang="ja-JP" altLang="en-US" smtClean="0"/>
           </a:p>
           <a:p>
             <a:pPr lvl="2"/>
             <a:r>
-              <a:rPr kumimoji="1" lang="ja-JP" altLang="en-US" smtClean="0"/>
+              <a:rPr kumimoji="1" lang="ja-JP" altLang="en-US"/>
               <a:t>第 </a:t>
             </a:r>
             <a:r>
-              <a:rPr kumimoji="1" lang="en-US" altLang="ja-JP" smtClean="0"/>
+              <a:rPr kumimoji="1" lang="en-US" altLang="ja-JP"/>
               <a:t>3 </a:t>
             </a:r>
             <a:r>
-              <a:rPr kumimoji="1" lang="ja-JP" altLang="en-US" smtClean="0"/>
+              <a:rPr kumimoji="1" lang="ja-JP" altLang="en-US"/>
               <a:t>レベル</a:t>
             </a:r>
-            <a:endParaRPr kumimoji="1" lang="ja-JP" altLang="en-US" smtClean="0"/>
           </a:p>
           <a:p>
             <a:pPr lvl="3"/>
             <a:r>
-              <a:rPr kumimoji="1" lang="ja-JP" altLang="en-US" smtClean="0"/>
+              <a:rPr kumimoji="1" lang="ja-JP" altLang="en-US"/>
               <a:t>第 </a:t>
             </a:r>
             <a:r>
-              <a:rPr kumimoji="1" lang="en-US" altLang="ja-JP" smtClean="0"/>
+              <a:rPr kumimoji="1" lang="en-US" altLang="ja-JP"/>
               <a:t>4 </a:t>
             </a:r>
             <a:r>
-              <a:rPr kumimoji="1" lang="ja-JP" altLang="en-US" smtClean="0"/>
+              <a:rPr kumimoji="1" lang="ja-JP" altLang="en-US"/>
               <a:t>レベル</a:t>
             </a:r>
-            <a:endParaRPr kumimoji="1" lang="ja-JP" altLang="en-US" smtClean="0"/>
           </a:p>
           <a:p>
             <a:pPr lvl="4"/>
             <a:r>
-              <a:rPr kumimoji="1" lang="ja-JP" altLang="en-US" smtClean="0"/>
+              <a:rPr kumimoji="1" lang="ja-JP" altLang="en-US"/>
               <a:t>第 </a:t>
             </a:r>
             <a:r>
-              <a:rPr kumimoji="1" lang="en-US" altLang="ja-JP" smtClean="0"/>
+              <a:rPr kumimoji="1" lang="en-US" altLang="ja-JP"/>
               <a:t>5 </a:t>
             </a:r>
             <a:r>
-              <a:rPr kumimoji="1" lang="ja-JP" altLang="en-US" smtClean="0"/>
+              <a:rPr kumimoji="1" lang="ja-JP" altLang="en-US"/>
               <a:t>レベル</a:t>
             </a:r>
-            <a:endParaRPr kumimoji="1" lang="ja-JP" altLang="en-US"/>
           </a:p>
         </p:txBody>
       </p:sp>
@@ -2114,10 +2089,9 @@
           <a:p>
             <a:pPr lvl="0"/>
             <a:r>
-              <a:rPr kumimoji="1" lang="ja-JP" altLang="en-US" smtClean="0"/>
+              <a:rPr kumimoji="1" lang="ja-JP" altLang="en-US"/>
               <a:t>マスター テキストの書式設定</a:t>
             </a:r>
-            <a:endParaRPr kumimoji="1" lang="ja-JP" altLang="en-US" smtClean="0"/>
           </a:p>
         </p:txBody>
       </p:sp>
@@ -2143,74 +2117,69 @@
           <a:p>
             <a:pPr lvl="0"/>
             <a:r>
-              <a:rPr kumimoji="1" lang="ja-JP" altLang="en-US" smtClean="0"/>
+              <a:rPr kumimoji="1" lang="ja-JP" altLang="en-US"/>
               <a:t>マスター テキストの書式設定</a:t>
             </a:r>
-            <a:endParaRPr kumimoji="1" lang="ja-JP" altLang="en-US" smtClean="0"/>
           </a:p>
           <a:p>
             <a:pPr lvl="1"/>
             <a:r>
-              <a:rPr kumimoji="1" lang="ja-JP" altLang="en-US" smtClean="0"/>
+              <a:rPr kumimoji="1" lang="ja-JP" altLang="en-US"/>
               <a:t>第 </a:t>
             </a:r>
             <a:r>
-              <a:rPr kumimoji="1" lang="en-US" altLang="ja-JP" smtClean="0"/>
+              <a:rPr kumimoji="1" lang="en-US" altLang="ja-JP"/>
               <a:t>2 </a:t>
             </a:r>
             <a:r>
-              <a:rPr kumimoji="1" lang="ja-JP" altLang="en-US" smtClean="0"/>
+              <a:rPr kumimoji="1" lang="ja-JP" altLang="en-US"/>
               <a:t>レベル</a:t>
             </a:r>
-            <a:endParaRPr kumimoji="1" lang="ja-JP" altLang="en-US" smtClean="0"/>
           </a:p>
           <a:p>
             <a:pPr lvl="2"/>
             <a:r>
-              <a:rPr kumimoji="1" lang="ja-JP" altLang="en-US" smtClean="0"/>
+              <a:rPr kumimoji="1" lang="ja-JP" altLang="en-US"/>
               <a:t>第 </a:t>
             </a:r>
             <a:r>
-              <a:rPr kumimoji="1" lang="en-US" altLang="ja-JP" smtClean="0"/>
+              <a:rPr kumimoji="1" lang="en-US" altLang="ja-JP"/>
               <a:t>3 </a:t>
             </a:r>
             <a:r>
-              <a:rPr kumimoji="1" lang="ja-JP" altLang="en-US" smtClean="0"/>
+              <a:rPr kumimoji="1" lang="ja-JP" altLang="en-US"/>
               <a:t>レベル</a:t>
             </a:r>
-            <a:endParaRPr kumimoji="1" lang="ja-JP" altLang="en-US" smtClean="0"/>
           </a:p>
           <a:p>
             <a:pPr lvl="3"/>
             <a:r>
-              <a:rPr kumimoji="1" lang="ja-JP" altLang="en-US" smtClean="0"/>
+              <a:rPr kumimoji="1" lang="ja-JP" altLang="en-US"/>
               <a:t>第 </a:t>
             </a:r>
             <a:r>
-              <a:rPr kumimoji="1" lang="en-US" altLang="ja-JP" smtClean="0"/>
+              <a:rPr kumimoji="1" lang="en-US" altLang="ja-JP"/>
               <a:t>4 </a:t>
             </a:r>
             <a:r>
-              <a:rPr kumimoji="1" lang="ja-JP" altLang="en-US" smtClean="0"/>
+              <a:rPr kumimoji="1" lang="ja-JP" altLang="en-US"/>
               <a:t>レベル</a:t>
             </a:r>
-            <a:endParaRPr kumimoji="1" lang="ja-JP" altLang="en-US" smtClean="0"/>
           </a:p>
           <a:p>
             <a:pPr lvl="4"/>
             <a:r>
-              <a:rPr kumimoji="1" lang="ja-JP" altLang="en-US" smtClean="0"/>
+              <a:rPr kumimoji="1" lang="ja-JP" altLang="en-US"/>
               <a:t>第 </a:t>
             </a:r>
             <a:r>
-              <a:rPr kumimoji="1" lang="en-US" altLang="ja-JP" smtClean="0"/>
+              <a:rPr kumimoji="1" lang="en-US" altLang="ja-JP"/>
               <a:t>5 </a:t>
             </a:r>
             <a:r>
-              <a:rPr kumimoji="1" lang="ja-JP" altLang="en-US" smtClean="0"/>
+              <a:rPr kumimoji="1" lang="ja-JP" altLang="en-US"/>
               <a:t>レベル</a:t>
             </a:r>
-            <a:endParaRPr kumimoji="1" lang="ja-JP" altLang="en-US"/>
           </a:p>
         </p:txBody>
       </p:sp>
@@ -2231,6 +2200,7 @@
           <a:p>
             <a:fld id="{14C5B98E-B881-44C6-965E-C4CBF4BD5DE0}" type="datetimeFigureOut">
               <a:rPr kumimoji="1" lang="ja-JP" altLang="en-US" smtClean="0"/>
+              <a:t>2023/10/16</a:t>
             </a:fld>
             <a:endParaRPr kumimoji="1" lang="ja-JP" altLang="en-US"/>
           </a:p>
@@ -2272,6 +2242,7 @@
           <a:p>
             <a:fld id="{B261B85B-3F11-4807-BF0A-089ABAB91E6D}" type="slidenum">
               <a:rPr kumimoji="1" lang="ja-JP" altLang="en-US" smtClean="0"/>
+              <a:t>‹#›</a:t>
             </a:fld>
             <a:endParaRPr kumimoji="1" lang="ja-JP" altLang="en-US"/>
           </a:p>
@@ -2282,13 +2253,6 @@
   <p:clrMapOvr>
     <a:masterClrMapping/>
   </p:clrMapOvr>
-  <p:timing>
-    <p:tnLst>
-      <p:par>
-        <p:cTn id="1" dur="indefinite" restart="never" nodeType="tmRoot"/>
-      </p:par>
-    </p:tnLst>
-  </p:timing>
 </p:sldLayout>
 </file>
 
@@ -2325,10 +2289,9 @@
           <a:lstStyle/>
           <a:p>
             <a:r>
-              <a:rPr kumimoji="1" lang="ja-JP" altLang="en-US" smtClean="0"/>
+              <a:rPr kumimoji="1" lang="ja-JP" altLang="en-US"/>
               <a:t>マスター タイトルの書式設定</a:t>
             </a:r>
-            <a:endParaRPr kumimoji="1" lang="ja-JP" altLang="en-US"/>
           </a:p>
         </p:txBody>
       </p:sp>
@@ -2349,6 +2312,7 @@
           <a:p>
             <a:fld id="{14C5B98E-B881-44C6-965E-C4CBF4BD5DE0}" type="datetimeFigureOut">
               <a:rPr kumimoji="1" lang="ja-JP" altLang="en-US" smtClean="0"/>
+              <a:t>2023/10/16</a:t>
             </a:fld>
             <a:endParaRPr kumimoji="1" lang="ja-JP" altLang="en-US"/>
           </a:p>
@@ -2390,6 +2354,7 @@
           <a:p>
             <a:fld id="{B261B85B-3F11-4807-BF0A-089ABAB91E6D}" type="slidenum">
               <a:rPr kumimoji="1" lang="ja-JP" altLang="en-US" smtClean="0"/>
+              <a:t>‹#›</a:t>
             </a:fld>
             <a:endParaRPr kumimoji="1" lang="ja-JP" altLang="en-US"/>
           </a:p>
@@ -2437,6 +2402,7 @@
           <a:p>
             <a:fld id="{14C5B98E-B881-44C6-965E-C4CBF4BD5DE0}" type="datetimeFigureOut">
               <a:rPr kumimoji="1" lang="ja-JP" altLang="en-US" smtClean="0"/>
+              <a:t>2023/10/16</a:t>
             </a:fld>
             <a:endParaRPr kumimoji="1" lang="ja-JP" altLang="en-US"/>
           </a:p>
@@ -2478,6 +2444,7 @@
           <a:p>
             <a:fld id="{B261B85B-3F11-4807-BF0A-089ABAB91E6D}" type="slidenum">
               <a:rPr kumimoji="1" lang="ja-JP" altLang="en-US" smtClean="0"/>
+              <a:t>‹#›</a:t>
             </a:fld>
             <a:endParaRPr kumimoji="1" lang="ja-JP" altLang="en-US"/>
           </a:p>
@@ -2488,13 +2455,6 @@
   <p:clrMapOvr>
     <a:masterClrMapping/>
   </p:clrMapOvr>
-  <p:timing>
-    <p:tnLst>
-      <p:par>
-        <p:cTn id="1" dur="indefinite" restart="never" nodeType="tmRoot"/>
-      </p:par>
-    </p:tnLst>
-  </p:timing>
 </p:sldLayout>
 </file>
 
@@ -2540,10 +2500,9 @@
           </a:lstStyle>
           <a:p>
             <a:r>
-              <a:rPr kumimoji="1" lang="ja-JP" altLang="en-US" smtClean="0"/>
+              <a:rPr kumimoji="1" lang="ja-JP" altLang="en-US"/>
               <a:t>マスター タイトルの書式設定</a:t>
             </a:r>
-            <a:endParaRPr kumimoji="1" lang="ja-JP" altLang="en-US"/>
           </a:p>
         </p:txBody>
       </p:sp>
@@ -2667,10 +2626,9 @@
           <a:p>
             <a:pPr lvl="0"/>
             <a:r>
-              <a:rPr kumimoji="1" lang="ja-JP" altLang="en-US" smtClean="0"/>
+              <a:rPr kumimoji="1" lang="ja-JP" altLang="en-US"/>
               <a:t>マスター テキストの書式設定</a:t>
             </a:r>
-            <a:endParaRPr kumimoji="1" lang="ja-JP" altLang="en-US" smtClean="0"/>
           </a:p>
         </p:txBody>
       </p:sp>
@@ -2691,6 +2649,7 @@
           <a:p>
             <a:fld id="{14C5B98E-B881-44C6-965E-C4CBF4BD5DE0}" type="datetimeFigureOut">
               <a:rPr kumimoji="1" lang="ja-JP" altLang="en-US" smtClean="0"/>
+              <a:t>2023/10/16</a:t>
             </a:fld>
             <a:endParaRPr kumimoji="1" lang="ja-JP" altLang="en-US"/>
           </a:p>
@@ -2732,6 +2691,7 @@
           <a:p>
             <a:fld id="{B261B85B-3F11-4807-BF0A-089ABAB91E6D}" type="slidenum">
               <a:rPr kumimoji="1" lang="ja-JP" altLang="en-US" smtClean="0"/>
+              <a:t>‹#›</a:t>
             </a:fld>
             <a:endParaRPr kumimoji="1" lang="ja-JP" altLang="en-US"/>
           </a:p>
@@ -2742,13 +2702,6 @@
   <p:clrMapOvr>
     <a:masterClrMapping/>
   </p:clrMapOvr>
-  <p:timing>
-    <p:tnLst>
-      <p:par>
-        <p:cTn id="1" dur="indefinite" restart="never" nodeType="tmRoot"/>
-      </p:par>
-    </p:tnLst>
-  </p:timing>
 </p:sldLayout>
 </file>
 
@@ -2799,7 +2752,6 @@
               <a:rPr lang="ja-JP"/>
               <a:t>マスター タイトルの書式設定</a:t>
             </a:r>
-            <a:endParaRPr lang="ja-JP"/>
           </a:p>
         </p:txBody>
       </p:sp>
@@ -2885,10 +2837,9 @@
               <a:buChar char="•"/>
             </a:pPr>
             <a:r>
-              <a:rPr kumimoji="1" lang="ja-JP" altLang="en-US" dirty="0" smtClean="0"/>
+              <a:rPr kumimoji="1" lang="ja-JP" altLang="en-US" dirty="0"/>
               <a:t>マスター テキストの書式設定</a:t>
             </a:r>
-            <a:endParaRPr kumimoji="1" lang="ja-JP" altLang="en-US" dirty="0" smtClean="0"/>
           </a:p>
           <a:p>
             <a:pPr marL="685800" lvl="1" indent="-228600" algn="l" defTabSz="914400" rtl="0" eaLnBrk="1" latinLnBrk="0" hangingPunct="1">
@@ -2902,18 +2853,9 @@
               <a:buChar char="•"/>
             </a:pPr>
             <a:r>
-              <a:rPr kumimoji="1" lang="ja-JP" altLang="en-US" dirty="0" smtClean="0"/>
-              <a:t>第 </a:t>
-            </a:r>
-            <a:r>
-              <a:rPr kumimoji="1" lang="ja-JP" altLang="en-US" dirty="0" smtClean="0"/>
-              <a:t>2 </a:t>
-            </a:r>
-            <a:r>
-              <a:rPr kumimoji="1" lang="ja-JP" altLang="en-US" dirty="0" smtClean="0"/>
-              <a:t>レベル</a:t>
-            </a:r>
-            <a:endParaRPr kumimoji="1" lang="ja-JP" altLang="en-US" dirty="0" smtClean="0"/>
+              <a:rPr kumimoji="1" lang="ja-JP" altLang="en-US" dirty="0"/>
+              <a:t>第 2 レベル</a:t>
+            </a:r>
           </a:p>
           <a:p>
             <a:pPr marL="1143000" lvl="2" indent="-228600" algn="l" defTabSz="914400" rtl="0" eaLnBrk="1" latinLnBrk="0" hangingPunct="1">
@@ -2927,18 +2869,17 @@
               <a:buChar char="•"/>
             </a:pPr>
             <a:r>
-              <a:rPr kumimoji="1" lang="ja-JP" altLang="en-US" dirty="0" smtClean="0"/>
+              <a:rPr kumimoji="1" lang="ja-JP" altLang="en-US" dirty="0"/>
               <a:t>第 </a:t>
             </a:r>
             <a:r>
-              <a:rPr kumimoji="1" lang="en-US" altLang="ja-JP" dirty="0" smtClean="0"/>
+              <a:rPr kumimoji="1" lang="en-US" altLang="ja-JP" dirty="0"/>
               <a:t>3 </a:t>
             </a:r>
             <a:r>
-              <a:rPr kumimoji="1" lang="ja-JP" altLang="en-US" dirty="0" smtClean="0"/>
+              <a:rPr kumimoji="1" lang="ja-JP" altLang="en-US" dirty="0"/>
               <a:t>レベル</a:t>
             </a:r>
-            <a:endParaRPr kumimoji="1" lang="ja-JP" altLang="en-US" dirty="0" smtClean="0"/>
           </a:p>
           <a:p>
             <a:pPr marL="1600200" lvl="3" indent="-228600" algn="l" defTabSz="914400" rtl="0" eaLnBrk="1" latinLnBrk="0" hangingPunct="1">
@@ -2952,18 +2893,17 @@
               <a:buChar char="•"/>
             </a:pPr>
             <a:r>
-              <a:rPr kumimoji="1" lang="ja-JP" altLang="en-US" dirty="0" smtClean="0"/>
+              <a:rPr kumimoji="1" lang="ja-JP" altLang="en-US" dirty="0"/>
               <a:t>第 </a:t>
             </a:r>
             <a:r>
-              <a:rPr kumimoji="1" lang="en-US" altLang="ja-JP" dirty="0" smtClean="0"/>
+              <a:rPr kumimoji="1" lang="en-US" altLang="ja-JP" dirty="0"/>
               <a:t>4 </a:t>
             </a:r>
             <a:r>
-              <a:rPr kumimoji="1" lang="ja-JP" altLang="en-US" dirty="0" smtClean="0"/>
+              <a:rPr kumimoji="1" lang="ja-JP" altLang="en-US" dirty="0"/>
               <a:t>レベル</a:t>
             </a:r>
-            <a:endParaRPr kumimoji="1" lang="ja-JP" altLang="en-US" dirty="0" smtClean="0"/>
           </a:p>
           <a:p>
             <a:pPr marL="2057400" lvl="4" indent="-228600" algn="l" defTabSz="914400" rtl="0" eaLnBrk="1" latinLnBrk="0" hangingPunct="1">
@@ -2977,18 +2917,17 @@
               <a:buChar char="•"/>
             </a:pPr>
             <a:r>
-              <a:rPr kumimoji="1" lang="ja-JP" altLang="en-US" dirty="0" smtClean="0"/>
+              <a:rPr kumimoji="1" lang="ja-JP" altLang="en-US" dirty="0"/>
               <a:t>第 </a:t>
             </a:r>
             <a:r>
-              <a:rPr kumimoji="1" lang="en-US" altLang="ja-JP" dirty="0" smtClean="0"/>
+              <a:rPr kumimoji="1" lang="en-US" altLang="ja-JP" dirty="0"/>
               <a:t>5 </a:t>
             </a:r>
             <a:r>
-              <a:rPr kumimoji="1" lang="ja-JP" altLang="en-US" dirty="0" smtClean="0"/>
+              <a:rPr kumimoji="1" lang="ja-JP" altLang="en-US" dirty="0"/>
               <a:t>レベル</a:t>
             </a:r>
-            <a:endParaRPr kumimoji="1" lang="ja-JP" altLang="en-US" dirty="0"/>
           </a:p>
         </p:txBody>
       </p:sp>
@@ -3009,6 +2948,7 @@
           <a:p>
             <a:fld id="{760FBDFE-C587-4B4C-A407-44438C67B59E}" type="datetimeFigureOut">
               <a:rPr lang="en-US" altLang="ja-JP" smtClean="0"/>
+              <a:t>10/16/2023</a:t>
             </a:fld>
             <a:endParaRPr lang="ja-JP"/>
           </a:p>
@@ -3050,6 +2990,7 @@
           <a:p>
             <a:fld id="{49AE70B2-8BF9-45C0-BB95-33D1B9D3A854}" type="slidenum">
               <a:rPr lang="en-US" altLang="ja-JP" smtClean="0"/>
+              <a:t>‹#›</a:t>
             </a:fld>
             <a:endParaRPr lang="ja-JP"/>
           </a:p>
@@ -3111,10 +3052,9 @@
           <a:lstStyle/>
           <a:p>
             <a:r>
-              <a:rPr kumimoji="1" lang="ja-JP" altLang="en-US" smtClean="0"/>
+              <a:rPr kumimoji="1" lang="ja-JP" altLang="en-US"/>
               <a:t>マスター タイトルの書式設定</a:t>
             </a:r>
-            <a:endParaRPr kumimoji="1" lang="ja-JP" altLang="en-US"/>
           </a:p>
         </p:txBody>
       </p:sp>
@@ -3145,74 +3085,69 @@
           <a:p>
             <a:pPr lvl="0"/>
             <a:r>
-              <a:rPr kumimoji="1" lang="ja-JP" altLang="en-US" smtClean="0"/>
+              <a:rPr kumimoji="1" lang="ja-JP" altLang="en-US"/>
               <a:t>マスター テキストの書式設定</a:t>
             </a:r>
-            <a:endParaRPr kumimoji="1" lang="ja-JP" altLang="en-US" smtClean="0"/>
           </a:p>
           <a:p>
             <a:pPr lvl="1"/>
             <a:r>
-              <a:rPr kumimoji="1" lang="ja-JP" altLang="en-US" smtClean="0"/>
+              <a:rPr kumimoji="1" lang="ja-JP" altLang="en-US"/>
               <a:t>第 </a:t>
             </a:r>
             <a:r>
-              <a:rPr kumimoji="1" lang="en-US" altLang="ja-JP" smtClean="0"/>
+              <a:rPr kumimoji="1" lang="en-US" altLang="ja-JP"/>
               <a:t>2 </a:t>
             </a:r>
             <a:r>
-              <a:rPr kumimoji="1" lang="ja-JP" altLang="en-US" smtClean="0"/>
+              <a:rPr kumimoji="1" lang="ja-JP" altLang="en-US"/>
               <a:t>レベル</a:t>
             </a:r>
-            <a:endParaRPr kumimoji="1" lang="ja-JP" altLang="en-US" smtClean="0"/>
           </a:p>
           <a:p>
             <a:pPr lvl="2"/>
             <a:r>
-              <a:rPr kumimoji="1" lang="ja-JP" altLang="en-US" smtClean="0"/>
+              <a:rPr kumimoji="1" lang="ja-JP" altLang="en-US"/>
               <a:t>第 </a:t>
             </a:r>
             <a:r>
-              <a:rPr kumimoji="1" lang="en-US" altLang="ja-JP" smtClean="0"/>
+              <a:rPr kumimoji="1" lang="en-US" altLang="ja-JP"/>
               <a:t>3 </a:t>
             </a:r>
             <a:r>
-              <a:rPr kumimoji="1" lang="ja-JP" altLang="en-US" smtClean="0"/>
+              <a:rPr kumimoji="1" lang="ja-JP" altLang="en-US"/>
               <a:t>レベル</a:t>
             </a:r>
-            <a:endParaRPr kumimoji="1" lang="ja-JP" altLang="en-US" smtClean="0"/>
           </a:p>
           <a:p>
             <a:pPr lvl="3"/>
             <a:r>
-              <a:rPr kumimoji="1" lang="ja-JP" altLang="en-US" smtClean="0"/>
+              <a:rPr kumimoji="1" lang="ja-JP" altLang="en-US"/>
               <a:t>第 </a:t>
             </a:r>
             <a:r>
-              <a:rPr kumimoji="1" lang="en-US" altLang="ja-JP" smtClean="0"/>
+              <a:rPr kumimoji="1" lang="en-US" altLang="ja-JP"/>
               <a:t>4 </a:t>
             </a:r>
             <a:r>
-              <a:rPr kumimoji="1" lang="ja-JP" altLang="en-US" smtClean="0"/>
+              <a:rPr kumimoji="1" lang="ja-JP" altLang="en-US"/>
               <a:t>レベル</a:t>
             </a:r>
-            <a:endParaRPr kumimoji="1" lang="ja-JP" altLang="en-US" smtClean="0"/>
           </a:p>
           <a:p>
             <a:pPr lvl="4"/>
             <a:r>
-              <a:rPr kumimoji="1" lang="ja-JP" altLang="en-US" smtClean="0"/>
+              <a:rPr kumimoji="1" lang="ja-JP" altLang="en-US"/>
               <a:t>第 </a:t>
             </a:r>
             <a:r>
-              <a:rPr kumimoji="1" lang="en-US" altLang="ja-JP" smtClean="0"/>
+              <a:rPr kumimoji="1" lang="en-US" altLang="ja-JP"/>
               <a:t>5 </a:t>
             </a:r>
             <a:r>
-              <a:rPr kumimoji="1" lang="ja-JP" altLang="en-US" smtClean="0"/>
+              <a:rPr kumimoji="1" lang="ja-JP" altLang="en-US"/>
               <a:t>レベル</a:t>
             </a:r>
-            <a:endParaRPr kumimoji="1" lang="ja-JP" altLang="en-US"/>
           </a:p>
         </p:txBody>
       </p:sp>
@@ -3251,6 +3186,7 @@
           <a:p>
             <a:fld id="{14C5B98E-B881-44C6-965E-C4CBF4BD5DE0}" type="datetimeFigureOut">
               <a:rPr kumimoji="1" lang="ja-JP" altLang="en-US" smtClean="0"/>
+              <a:t>2023/10/16</a:t>
             </a:fld>
             <a:endParaRPr kumimoji="1" lang="ja-JP" altLang="en-US"/>
           </a:p>
@@ -3328,6 +3264,7 @@
           <a:p>
             <a:fld id="{B261B85B-3F11-4807-BF0A-089ABAB91E6D}" type="slidenum">
               <a:rPr kumimoji="1" lang="ja-JP" altLang="en-US" smtClean="0"/>
+              <a:t>‹#›</a:t>
             </a:fld>
             <a:endParaRPr kumimoji="1" lang="ja-JP" altLang="en-US"/>
           </a:p>
@@ -3348,13 +3285,6 @@
     <p:sldLayoutId id="2147483657" r:id="rId9"/>
     <p:sldLayoutId id="2147483658" r:id="rId10"/>
   </p:sldLayoutIdLst>
-  <p:timing>
-    <p:tnLst>
-      <p:par>
-        <p:cTn id="1" dur="indefinite" restart="never" nodeType="tmRoot"/>
-      </p:par>
-    </p:tnLst>
-  </p:timing>
   <p:txStyles>
     <p:titleStyle>
       <a:lvl1pPr algn="l" defTabSz="914400" rtl="0" eaLnBrk="1" latinLnBrk="0" hangingPunct="1">
@@ -3687,9 +3617,6 @@
           <a:p>
             <a:r>
               <a:rPr kumimoji="1" lang="ja-JP" altLang="en-US" dirty="0">
-                <a:solidFill>
-                  <a:srgbClr val="FF0000"/>
-                </a:solidFill>
                 <a:latin typeface="FOT-Popハッピネス Std EB" panose="02020900000000000000" charset="-128"/>
                 <a:ea typeface="FOT-Popハッピネス Std EB" panose="02020900000000000000" charset="-128"/>
               </a:rPr>
@@ -3697,15 +3624,16 @@
             </a:r>
             <a:r>
               <a:rPr kumimoji="1" lang="ja-JP" altLang="en-US" dirty="0">
+                <a:solidFill>
+                  <a:schemeClr val="accent1">
+                    <a:lumMod val="50000"/>
+                  </a:schemeClr>
+                </a:solidFill>
                 <a:latin typeface="FOT-Popハッピネス Std EB" panose="02020900000000000000" charset="-128"/>
                 <a:ea typeface="FOT-Popハッピネス Std EB" panose="02020900000000000000" charset="-128"/>
               </a:rPr>
               <a:t>くんのひきこもり脱出ゲーム</a:t>
             </a:r>
-            <a:endParaRPr kumimoji="1" lang="ja-JP" altLang="en-US" dirty="0">
-              <a:latin typeface="FOT-Popハッピネス Std EB" panose="02020900000000000000" charset="-128"/>
-              <a:ea typeface="FOT-Popハッピネス Std EB" panose="02020900000000000000" charset="-128"/>
-            </a:endParaRPr>
           </a:p>
         </p:txBody>
       </p:sp>
@@ -3729,10 +3657,11 @@
           <a:bodyPr wrap="square" rtlCol="0">
             <a:spAutoFit/>
           </a:bodyPr>
+          <a:lstStyle/>
           <a:p>
             <a:pPr algn="l"/>
             <a:r>
-              <a:rPr lang="ja-JP" altLang="en-US" sz="3200">
+              <a:rPr lang="ja-JP" altLang="en-US" sz="3200" dirty="0">
                 <a:solidFill>
                   <a:schemeClr val="accent6"/>
                 </a:solidFill>
@@ -3743,31 +3672,44 @@
               <a:t>ジャンル</a:t>
             </a:r>
             <a:r>
-              <a:rPr lang="en-US" altLang="ja-JP" sz="3200">
-                <a:latin typeface="FOT-Popハッピネス Std EB" panose="02020900000000000000" charset="-128"/>
-                <a:ea typeface="FOT-Popハッピネス Std EB" panose="02020900000000000000" charset="-128"/>
-                <a:cs typeface="FOT-Popハッピネス Std EB" panose="02020900000000000000" charset="-128"/>
-              </a:rPr>
-              <a:t>		2D</a:t>
-            </a:r>
-            <a:r>
-              <a:rPr lang="ja-JP" altLang="en-US" sz="3200">
+              <a:rPr lang="en-US" altLang="ja-JP" sz="3200" dirty="0">
+                <a:latin typeface="FOT-Popハッピネス Std EB" panose="02020900000000000000" charset="-128"/>
+                <a:ea typeface="FOT-Popハッピネス Std EB" panose="02020900000000000000" charset="-128"/>
+                <a:cs typeface="FOT-Popハッピネス Std EB" panose="02020900000000000000" charset="-128"/>
+              </a:rPr>
+              <a:t>		</a:t>
+            </a:r>
+            <a:r>
+              <a:rPr lang="en-US" altLang="ja-JP" sz="3200" dirty="0">
+                <a:solidFill>
+                  <a:schemeClr val="accent1">
+                    <a:lumMod val="50000"/>
+                  </a:schemeClr>
+                </a:solidFill>
+                <a:latin typeface="FOT-Popハッピネス Std EB" panose="02020900000000000000" charset="-128"/>
+                <a:ea typeface="FOT-Popハッピネス Std EB" panose="02020900000000000000" charset="-128"/>
+                <a:cs typeface="FOT-Popハッピネス Std EB" panose="02020900000000000000" charset="-128"/>
+              </a:rPr>
+              <a:t>2D</a:t>
+            </a:r>
+            <a:r>
+              <a:rPr lang="ja-JP" altLang="en-US" sz="3200" dirty="0">
+                <a:solidFill>
+                  <a:schemeClr val="accent1">
+                    <a:lumMod val="50000"/>
+                  </a:schemeClr>
+                </a:solidFill>
                 <a:latin typeface="FOT-Popハッピネス Std EB" panose="02020900000000000000" charset="-128"/>
                 <a:ea typeface="FOT-Popハッピネス Std EB" panose="02020900000000000000" charset="-128"/>
                 <a:cs typeface="FOT-Popハッピネス Std EB" panose="02020900000000000000" charset="-128"/>
               </a:rPr>
               <a:t>横スクロールアクション</a:t>
             </a:r>
-            <a:endParaRPr lang="ja-JP" altLang="en-US" sz="3200">
-              <a:latin typeface="FOT-Popハッピネス Std EB" panose="02020900000000000000" charset="-128"/>
-              <a:ea typeface="FOT-Popハッピネス Std EB" panose="02020900000000000000" charset="-128"/>
-              <a:cs typeface="FOT-Popハッピネス Std EB" panose="02020900000000000000" charset="-128"/>
-            </a:endParaRPr>
           </a:p>
           <a:p>
             <a:pPr algn="l"/>
             <a:r>
-              <a:rPr lang="ja-JP" altLang="en-US" sz="3200">
+              <a:rPr lang="ja-JP" altLang="en-US" sz="3200" dirty="0">
                 <a:solidFill>
                   <a:srgbClr val="7030A0"/>
                 </a:solidFill>
@@ -3778,7 +3720,7 @@
               <a:t>コンセプト</a:t>
             </a:r>
             <a:r>
-              <a:rPr lang="en-US" altLang="ja-JP" sz="3200">
+              <a:rPr lang="en-US" altLang="ja-JP" sz="3200" dirty="0">
                 <a:latin typeface="FOT-Popハッピネス Std EB" panose="02020900000000000000" charset="-128"/>
                 <a:ea typeface="FOT-Popハッピネス Std EB" panose="02020900000000000000" charset="-128"/>
                 <a:cs typeface="FOT-Popハッピネス Std EB" panose="02020900000000000000" charset="-128"/>
@@ -3786,7 +3728,12 @@
               <a:t>	</a:t>
             </a:r>
             <a:r>
-              <a:rPr lang="ja-JP" altLang="en-US" sz="3200">
+              <a:rPr lang="ja-JP" altLang="en-US" sz="3200" dirty="0">
+                <a:solidFill>
+                  <a:schemeClr val="accent1">
+                    <a:lumMod val="50000"/>
+                  </a:schemeClr>
+                </a:solidFill>
                 <a:latin typeface="FOT-Popハッピネス Std EB" panose="02020900000000000000" charset="-128"/>
                 <a:ea typeface="FOT-Popハッピネス Std EB" panose="02020900000000000000" charset="-128"/>
                 <a:cs typeface="FOT-Popハッピネス Std EB" panose="02020900000000000000" charset="-128"/>
@@ -3794,17 +3741,11 @@
               </a:rPr>
               <a:t>精神力増強トレーニングゲーム・改</a:t>
             </a:r>
-            <a:endParaRPr lang="ja-JP" altLang="en-US" sz="3200">
-              <a:latin typeface="FOT-Popハッピネス Std EB" panose="02020900000000000000" charset="-128"/>
-              <a:ea typeface="FOT-Popハッピネス Std EB" panose="02020900000000000000" charset="-128"/>
-              <a:cs typeface="FOT-Popハッピネス Std EB" panose="02020900000000000000" charset="-128"/>
-              <a:sym typeface="+mn-ea"/>
-            </a:endParaRPr>
           </a:p>
           <a:p>
             <a:pPr algn="l"/>
             <a:r>
-              <a:rPr lang="ja-JP" altLang="en-US" sz="3200">
+              <a:rPr lang="ja-JP" altLang="en-US" sz="3200" dirty="0">
                 <a:solidFill>
                   <a:schemeClr val="accent5"/>
                 </a:solidFill>
@@ -3816,7 +3757,7 @@
               <a:t>ターゲット</a:t>
             </a:r>
             <a:r>
-              <a:rPr lang="en-US" altLang="ja-JP" sz="3200">
+              <a:rPr lang="en-US" altLang="ja-JP" sz="3200" dirty="0">
                 <a:latin typeface="FOT-Popハッピネス Std EB" panose="02020900000000000000" charset="-128"/>
                 <a:ea typeface="FOT-Popハッピネス Std EB" panose="02020900000000000000" charset="-128"/>
                 <a:cs typeface="FOT-Popハッピネス Std EB" panose="02020900000000000000" charset="-128"/>
@@ -3825,24 +3766,25 @@
               <a:t>	</a:t>
             </a:r>
             <a:r>
-              <a:rPr lang="ja-JP" altLang="en-US" sz="3200">
+              <a:rPr lang="ja-JP" altLang="en-US" sz="3200" dirty="0">
+                <a:solidFill>
+                  <a:schemeClr val="accent1">
+                    <a:lumMod val="50000"/>
+                  </a:schemeClr>
+                </a:solidFill>
                 <a:latin typeface="FOT-Popハッピネス Std EB" panose="02020900000000000000" charset="-128"/>
                 <a:ea typeface="FOT-Popハッピネス Std EB" panose="02020900000000000000" charset="-128"/>
                 <a:cs typeface="FOT-Popハッピネス Std EB" panose="02020900000000000000" charset="-128"/>
                 <a:sym typeface="+mn-ea"/>
               </a:rPr>
-              <a:t>メンタルトレーニングをしたい</a:t>
-            </a:r>
-            <a:r>
-              <a:rPr lang="ja-JP" altLang="en-US" sz="3200">
-                <a:latin typeface="FOT-Popハッピネス Std EB" panose="02020900000000000000" charset="-128"/>
-                <a:ea typeface="FOT-Popハッピネス Std EB" panose="02020900000000000000" charset="-128"/>
-                <a:cs typeface="FOT-Popハッピネス Std EB" panose="02020900000000000000" charset="-128"/>
-                <a:sym typeface="+mn-ea"/>
-              </a:rPr>
-              <a:t>人</a:t>
-            </a:r>
-            <a:endParaRPr lang="en-US" altLang="ja-JP" sz="3200">
+              <a:t>メンタルトレーニングをしたい人</a:t>
+            </a:r>
+            <a:endParaRPr lang="en-US" altLang="ja-JP" sz="3200" dirty="0">
+              <a:solidFill>
+                <a:schemeClr val="accent1">
+                  <a:lumMod val="50000"/>
+                </a:schemeClr>
+              </a:solidFill>
               <a:latin typeface="FOT-Popハッピネス Std EB" panose="02020900000000000000" charset="-128"/>
               <a:ea typeface="FOT-Popハッピネス Std EB" panose="02020900000000000000" charset="-128"/>
               <a:cs typeface="FOT-Popハッピネス Std EB" panose="02020900000000000000" charset="-128"/>
@@ -3860,7 +3802,7 @@
           <p:nvPr/>
         </p:nvPicPr>
         <p:blipFill>
-          <a:blip r:embed="rId1"/>
+          <a:blip r:embed="rId3"/>
           <a:srcRect b="33173"/>
           <a:stretch>
             <a:fillRect/>
@@ -3881,13 +3823,6 @@
   <p:clrMapOvr>
     <a:masterClrMapping/>
   </p:clrMapOvr>
-  <p:timing>
-    <p:tnLst>
-      <p:par>
-        <p:cTn id="1" dur="indefinite" restart="never" nodeType="tmRoot"/>
-      </p:par>
-    </p:tnLst>
-  </p:timing>
 </p:sld>
 </file>
 
@@ -3908,7 +3843,14 @@
         <p:cNvGrpSpPr/>
         <p:nvPr/>
       </p:nvGrpSpPr>
-      <p:grpSpPr/>
+      <p:grpSpPr>
+        <a:xfrm>
+          <a:off x="0" y="0"/>
+          <a:ext cx="0" cy="0"/>
+          <a:chOff x="0" y="0"/>
+          <a:chExt cx="0" cy="0"/>
+        </a:xfrm>
+      </p:grpSpPr>
       <p:sp>
         <p:nvSpPr>
           <p:cNvPr id="4" name="タイトル 1"/>
@@ -3956,10 +3898,6 @@
               </a:rPr>
               <a:t>Untitled</a:t>
             </a:r>
-            <a:endParaRPr lang="en-US" altLang="ja-JP" sz="4000">
-              <a:latin typeface="FOT-Popハッピネス Std EB" panose="02020900000000000000" charset="-128"/>
-              <a:ea typeface="FOT-Popハッピネス Std EB" panose="02020900000000000000" charset="-128"/>
-            </a:endParaRPr>
           </a:p>
         </p:txBody>
       </p:sp>
@@ -3983,10 +3921,11 @@
           <a:bodyPr wrap="square" rtlCol="0">
             <a:noAutofit/>
           </a:bodyPr>
+          <a:lstStyle/>
           <a:p>
             <a:pPr algn="l"/>
             <a:r>
-              <a:rPr lang="ja-JP" altLang="en-US" sz="3000">
+              <a:rPr lang="ja-JP" altLang="en-US" sz="3000" dirty="0">
                 <a:solidFill>
                   <a:schemeClr val="tx2"/>
                 </a:solidFill>
@@ -3996,7 +3935,7 @@
               </a:rPr>
               <a:t>ある日、ママから一通の手紙が。</a:t>
             </a:r>
-            <a:endParaRPr lang="en-US" altLang="ja-JP" sz="3000">
+            <a:endParaRPr lang="en-US" altLang="ja-JP" sz="3000" dirty="0">
               <a:solidFill>
                 <a:schemeClr val="tx2"/>
               </a:solidFill>
@@ -4008,7 +3947,7 @@
           <a:p>
             <a:pPr algn="l"/>
             <a:r>
-              <a:rPr lang="ja-JP" altLang="en-US" sz="3000">
+              <a:rPr lang="ja-JP" altLang="en-US" sz="3000" dirty="0">
                 <a:solidFill>
                   <a:schemeClr val="tx2"/>
                 </a:solidFill>
@@ -4019,7 +3958,7 @@
               <a:t>これからは自分の手で稼がなければ</a:t>
             </a:r>
             <a:r>
-              <a:rPr lang="en-US" altLang="ja-JP" sz="3000">
+              <a:rPr lang="en-US" altLang="ja-JP" sz="3000" dirty="0">
                 <a:solidFill>
                   <a:schemeClr val="tx2"/>
                 </a:solidFill>
@@ -4029,7 +3968,7 @@
               </a:rPr>
               <a:t>...</a:t>
             </a:r>
-            <a:endParaRPr lang="ja-JP" altLang="en-US" sz="3000">
+            <a:endParaRPr lang="ja-JP" altLang="en-US" sz="3000" dirty="0">
               <a:solidFill>
                 <a:schemeClr val="tx2"/>
               </a:solidFill>
@@ -4040,7 +3979,7 @@
           </a:p>
           <a:p>
             <a:pPr algn="l"/>
-            <a:endParaRPr lang="ja-JP" altLang="en-US" sz="3000">
+            <a:endParaRPr lang="ja-JP" altLang="en-US" sz="3000" dirty="0">
               <a:solidFill>
                 <a:schemeClr val="tx2"/>
               </a:solidFill>
@@ -4052,7 +3991,7 @@
           <a:p>
             <a:pPr algn="l"/>
             <a:r>
-              <a:rPr lang="ja-JP" altLang="en-US" sz="3000">
+              <a:rPr lang="ja-JP" altLang="en-US" sz="3000" dirty="0">
                 <a:solidFill>
                   <a:schemeClr val="tx2"/>
                 </a:solidFill>
@@ -4063,15 +4002,6 @@
               </a:rPr>
               <a:t>沢山の試練を乗り越えて就職を目指そう</a:t>
             </a:r>
-            <a:endParaRPr lang="ja-JP" altLang="en-US" sz="3000">
-              <a:solidFill>
-                <a:schemeClr val="tx2"/>
-              </a:solidFill>
-              <a:latin typeface="FOT-Popハッピネス Std EB" panose="02020900000000000000" charset="-128"/>
-              <a:ea typeface="FOT-Popハッピネス Std EB" panose="02020900000000000000" charset="-128"/>
-              <a:cs typeface="FOT-Popハッピネス Std EB" panose="02020900000000000000" charset="-128"/>
-              <a:sym typeface="+mn-ea"/>
-            </a:endParaRPr>
           </a:p>
         </p:txBody>
       </p:sp>
@@ -4084,7 +4014,7 @@
           <p:nvPr/>
         </p:nvPicPr>
         <p:blipFill>
-          <a:blip r:embed="rId1"/>
+          <a:blip r:embed="rId2"/>
           <a:srcRect l="7" r="7"/>
           <a:stretch>
             <a:fillRect/>
@@ -4116,7 +4046,7 @@
           <p:nvPr/>
         </p:nvPicPr>
         <p:blipFill>
-          <a:blip r:embed="rId2"/>
+          <a:blip r:embed="rId3"/>
           <a:stretch>
             <a:fillRect/>
           </a:stretch>
@@ -4151,9 +4081,10 @@
           <a:bodyPr wrap="square" rtlCol="0">
             <a:spAutoFit/>
           </a:bodyPr>
-          <a:p>
-            <a:r>
-              <a:rPr lang="ja-JP" altLang="en-US" sz="2400">
+          <a:lstStyle/>
+          <a:p>
+            <a:r>
+              <a:rPr lang="ja-JP" altLang="en-US" sz="2400" dirty="0">
                 <a:solidFill>
                   <a:schemeClr val="tx2"/>
                 </a:solidFill>
@@ -4162,42 +4093,18 @@
               </a:rPr>
               <a:t>全三話</a:t>
             </a:r>
-            <a:endParaRPr lang="ja-JP" altLang="en-US" sz="2400">
-              <a:solidFill>
-                <a:schemeClr val="tx2"/>
-              </a:solidFill>
-              <a:latin typeface="FOT-Popハッピネス Std EB" panose="02020900000000000000" charset="-128"/>
-              <a:ea typeface="FOT-Popハッピネス Std EB" panose="02020900000000000000" charset="-128"/>
-            </a:endParaRPr>
-          </a:p>
-          <a:p>
-            <a:r>
-              <a:rPr lang="ja-JP" altLang="en-US" sz="2400">
+          </a:p>
+          <a:p>
+            <a:r>
+              <a:rPr lang="ja-JP" altLang="en-US" sz="2400" dirty="0">
                 <a:solidFill>
                   <a:schemeClr val="tx2"/>
                 </a:solidFill>
                 <a:latin typeface="FOT-Popハッピネス Std EB" panose="02020900000000000000" charset="-128"/>
                 <a:ea typeface="FOT-Popハッピネス Std EB" panose="02020900000000000000" charset="-128"/>
               </a:rPr>
-              <a:t>ステージ</a:t>
-            </a:r>
-            <a:r>
-              <a:rPr lang="ja-JP" altLang="en-US" sz="2400">
-                <a:solidFill>
-                  <a:schemeClr val="tx2"/>
-                </a:solidFill>
-                <a:latin typeface="FOT-Popハッピネス Std EB" panose="02020900000000000000" charset="-128"/>
-                <a:ea typeface="FOT-Popハッピネス Std EB" panose="02020900000000000000" charset="-128"/>
-              </a:rPr>
-              <a:t>選択制</a:t>
-            </a:r>
-            <a:endParaRPr lang="ja-JP" altLang="en-US" sz="2400">
-              <a:solidFill>
-                <a:schemeClr val="tx2"/>
-              </a:solidFill>
-              <a:latin typeface="FOT-Popハッピネス Std EB" panose="02020900000000000000" charset="-128"/>
-              <a:ea typeface="FOT-Popハッピネス Std EB" panose="02020900000000000000" charset="-128"/>
-            </a:endParaRPr>
+              <a:t>ステージ選択制</a:t>
+            </a:r>
           </a:p>
         </p:txBody>
       </p:sp>
@@ -4226,7 +4133,14 @@
         <p:cNvGrpSpPr/>
         <p:nvPr/>
       </p:nvGrpSpPr>
-      <p:grpSpPr/>
+      <p:grpSpPr>
+        <a:xfrm>
+          <a:off x="0" y="0"/>
+          <a:ext cx="0" cy="0"/>
+          <a:chOff x="0" y="0"/>
+          <a:chExt cx="0" cy="0"/>
+        </a:xfrm>
+      </p:grpSpPr>
       <p:sp>
         <p:nvSpPr>
           <p:cNvPr id="2" name="タイトル 1"/>
@@ -4247,19 +4161,21 @@
           <a:bodyPr>
             <a:noAutofit/>
           </a:bodyPr>
+          <a:lstStyle/>
           <a:p>
             <a:pPr algn="ctr"/>
             <a:r>
-              <a:rPr lang="ja-JP" altLang="en-US" sz="4000">
+              <a:rPr lang="ja-JP" altLang="en-US" sz="4000" dirty="0">
+                <a:solidFill>
+                  <a:schemeClr val="accent1">
+                    <a:lumMod val="50000"/>
+                  </a:schemeClr>
+                </a:solidFill>
                 <a:latin typeface="FOT-Popハッピネス Std EB" panose="02020900000000000000" charset="-128"/>
                 <a:ea typeface="FOT-Popハッピネス Std EB" panose="02020900000000000000" charset="-128"/>
               </a:rPr>
               <a:t>操作方法</a:t>
             </a:r>
-            <a:endParaRPr lang="ja-JP" altLang="en-US" sz="4000">
-              <a:latin typeface="FOT-Popハッピネス Std EB" panose="02020900000000000000" charset="-128"/>
-              <a:ea typeface="FOT-Popハッピネス Std EB" panose="02020900000000000000" charset="-128"/>
-            </a:endParaRPr>
           </a:p>
         </p:txBody>
       </p:sp>
@@ -4272,7 +4188,7 @@
           <p:nvPr/>
         </p:nvPicPr>
         <p:blipFill>
-          <a:blip r:embed="rId1"/>
+          <a:blip r:embed="rId2"/>
           <a:srcRect/>
           <a:stretch>
             <a:fillRect/>
@@ -4309,9 +4225,10 @@
           <a:bodyPr wrap="square" rtlCol="0">
             <a:spAutoFit/>
           </a:bodyPr>
-          <a:p>
-            <a:r>
-              <a:rPr lang="en-US" altLang="ja-JP" sz="2800">
+          <a:lstStyle/>
+          <a:p>
+            <a:r>
+              <a:rPr lang="en-US" altLang="ja-JP" sz="2800" dirty="0">
                 <a:ln w="3175">
                   <a:noFill/>
                 </a:ln>
@@ -4326,7 +4243,7 @@
               <a:t>Esc</a:t>
             </a:r>
             <a:r>
-              <a:rPr lang="en-US" altLang="ja-JP" sz="2800">
+              <a:rPr lang="en-US" altLang="ja-JP" sz="2800" dirty="0">
                 <a:latin typeface="FOT-Popハッピネス Std EB" panose="02020900000000000000" charset="-128"/>
                 <a:ea typeface="FOT-Popハッピネス Std EB" panose="02020900000000000000" charset="-128"/>
                 <a:cs typeface="FOT-Popハッピネス Std EB" panose="02020900000000000000" charset="-128"/>
@@ -4334,7 +4251,12 @@
               <a:t> </a:t>
             </a:r>
             <a:r>
-              <a:rPr lang="ja-JP" altLang="en-US" sz="2800">
+              <a:rPr lang="ja-JP" altLang="en-US" sz="2800" dirty="0">
+                <a:solidFill>
+                  <a:schemeClr val="accent1">
+                    <a:lumMod val="50000"/>
+                  </a:schemeClr>
+                </a:solidFill>
                 <a:latin typeface="FOT-Popハッピネス Std EB" panose="02020900000000000000" charset="-128"/>
                 <a:ea typeface="FOT-Popハッピネス Std EB" panose="02020900000000000000" charset="-128"/>
                 <a:cs typeface="FOT-Popハッピネス Std EB" panose="02020900000000000000" charset="-128"/>
@@ -4342,15 +4264,28 @@
               <a:t>ポーズ</a:t>
             </a:r>
             <a:r>
-              <a:rPr lang="en-US" altLang="ja-JP" sz="2800">
-                <a:latin typeface="FOT-Popハッピネス Std EB" panose="02020900000000000000" charset="-128"/>
-                <a:ea typeface="FOT-Popハッピネス Std EB" panose="02020900000000000000" charset="-128"/>
-                <a:cs typeface="FOT-Popハッピネス Std EB" panose="02020900000000000000" charset="-128"/>
-              </a:rPr>
-              <a:t>		</a:t>
-            </a:r>
-            <a:r>
-              <a:rPr lang="en-US" altLang="ja-JP" sz="2800">
+              <a:rPr lang="en-US" altLang="ja-JP" sz="2800" dirty="0">
+                <a:solidFill>
+                  <a:schemeClr val="accent1">
+                    <a:lumMod val="50000"/>
+                  </a:schemeClr>
+                </a:solidFill>
+                <a:latin typeface="FOT-Popハッピネス Std EB" panose="02020900000000000000" charset="-128"/>
+                <a:ea typeface="FOT-Popハッピネス Std EB" panose="02020900000000000000" charset="-128"/>
+                <a:cs typeface="FOT-Popハッピネス Std EB" panose="02020900000000000000" charset="-128"/>
+              </a:rPr>
+              <a:t>	</a:t>
+            </a:r>
+            <a:r>
+              <a:rPr lang="en-US" altLang="ja-JP" sz="2800" dirty="0">
+                <a:latin typeface="FOT-Popハッピネス Std EB" panose="02020900000000000000" charset="-128"/>
+                <a:ea typeface="FOT-Popハッピネス Std EB" panose="02020900000000000000" charset="-128"/>
+                <a:cs typeface="FOT-Popハッピネス Std EB" panose="02020900000000000000" charset="-128"/>
+              </a:rPr>
+              <a:t>	</a:t>
+            </a:r>
+            <a:r>
+              <a:rPr lang="en-US" altLang="ja-JP" sz="2800" dirty="0">
                 <a:solidFill>
                   <a:srgbClr val="FF0000"/>
                 </a:solidFill>
@@ -4361,7 +4296,7 @@
               <a:t>W</a:t>
             </a:r>
             <a:r>
-              <a:rPr lang="en-US" altLang="ja-JP" sz="2800">
+              <a:rPr lang="en-US" altLang="ja-JP" sz="2800" dirty="0">
                 <a:latin typeface="FOT-Popハッピネス Std EB" panose="02020900000000000000" charset="-128"/>
                 <a:ea typeface="FOT-Popハッピネス Std EB" panose="02020900000000000000" charset="-128"/>
                 <a:cs typeface="FOT-Popハッピネス Std EB" panose="02020900000000000000" charset="-128"/>
@@ -4369,7 +4304,12 @@
               <a:t> </a:t>
             </a:r>
             <a:r>
-              <a:rPr lang="ja-JP" altLang="en-US" sz="2800">
+              <a:rPr lang="ja-JP" altLang="en-US" sz="2800" dirty="0">
+                <a:solidFill>
+                  <a:schemeClr val="accent1">
+                    <a:lumMod val="50000"/>
+                  </a:schemeClr>
+                </a:solidFill>
                 <a:latin typeface="FOT-Popハッピネス Std EB" panose="02020900000000000000" charset="-128"/>
                 <a:ea typeface="FOT-Popハッピネス Std EB" panose="02020900000000000000" charset="-128"/>
                 <a:cs typeface="FOT-Popハッピネス Std EB" panose="02020900000000000000" charset="-128"/>
@@ -4377,7 +4317,7 @@
               <a:t>ジャンプ</a:t>
             </a:r>
             <a:r>
-              <a:rPr lang="en-US" altLang="ja-JP" sz="2800">
+              <a:rPr lang="en-US" altLang="ja-JP" sz="2800" dirty="0">
                 <a:latin typeface="FOT-Popハッピネス Std EB" panose="02020900000000000000" charset="-128"/>
                 <a:ea typeface="FOT-Popハッピネス Std EB" panose="02020900000000000000" charset="-128"/>
                 <a:cs typeface="FOT-Popハッピネス Std EB" panose="02020900000000000000" charset="-128"/>
@@ -4385,7 +4325,7 @@
               <a:t>	</a:t>
             </a:r>
             <a:r>
-              <a:rPr lang="en-US" altLang="ja-JP" sz="2800">
+              <a:rPr lang="en-US" altLang="ja-JP" sz="2800" dirty="0">
                 <a:solidFill>
                   <a:srgbClr val="0070C0"/>
                 </a:solidFill>
@@ -4397,7 +4337,7 @@
               <a:t>I</a:t>
             </a:r>
             <a:r>
-              <a:rPr lang="en-US" altLang="ja-JP" sz="2800">
+              <a:rPr lang="en-US" altLang="ja-JP" sz="2800" dirty="0">
                 <a:latin typeface="FOT-Popハッピネス Std EB" panose="02020900000000000000" charset="-128"/>
                 <a:ea typeface="FOT-Popハッピネス Std EB" panose="02020900000000000000" charset="-128"/>
                 <a:cs typeface="FOT-Popハッピネス Std EB" panose="02020900000000000000" charset="-128"/>
@@ -4406,7 +4346,12 @@
               <a:t> </a:t>
             </a:r>
             <a:r>
-              <a:rPr lang="ja-JP" altLang="en-US" sz="2800">
+              <a:rPr lang="ja-JP" altLang="en-US" sz="2800" dirty="0">
+                <a:solidFill>
+                  <a:schemeClr val="accent1">
+                    <a:lumMod val="50000"/>
+                  </a:schemeClr>
+                </a:solidFill>
                 <a:latin typeface="FOT-Popハッピネス Std EB" panose="02020900000000000000" charset="-128"/>
                 <a:ea typeface="FOT-Popハッピネス Std EB" panose="02020900000000000000" charset="-128"/>
                 <a:cs typeface="FOT-Popハッピネス Std EB" panose="02020900000000000000" charset="-128"/>
@@ -4414,7 +4359,12 @@
               </a:rPr>
               <a:t>ズームイン</a:t>
             </a:r>
-            <a:endParaRPr lang="ja-JP" altLang="en-US" sz="2800">
+            <a:endParaRPr lang="ja-JP" altLang="en-US" sz="2800" dirty="0">
+              <a:solidFill>
+                <a:schemeClr val="accent1">
+                  <a:lumMod val="50000"/>
+                </a:schemeClr>
+              </a:solidFill>
               <a:latin typeface="FOT-Popハッピネス Std EB" panose="02020900000000000000" charset="-128"/>
               <a:ea typeface="FOT-Popハッピネス Std EB" panose="02020900000000000000" charset="-128"/>
               <a:cs typeface="FOT-Popハッピネス Std EB" panose="02020900000000000000" charset="-128"/>
@@ -4422,7 +4372,7 @@
           </a:p>
           <a:p>
             <a:r>
-              <a:rPr lang="en-US" altLang="ja-JP" sz="2800">
+              <a:rPr lang="en-US" altLang="ja-JP" sz="2800" dirty="0">
                 <a:solidFill>
                   <a:srgbClr val="FF0000"/>
                 </a:solidFill>
@@ -4433,7 +4383,7 @@
               <a:t>			A</a:t>
             </a:r>
             <a:r>
-              <a:rPr lang="en-US" altLang="ja-JP" sz="2800">
+              <a:rPr lang="en-US" altLang="ja-JP" sz="2800" dirty="0">
                 <a:latin typeface="FOT-Popハッピネス Std EB" panose="02020900000000000000" charset="-128"/>
                 <a:ea typeface="FOT-Popハッピネス Std EB" panose="02020900000000000000" charset="-128"/>
                 <a:cs typeface="FOT-Popハッピネス Std EB" panose="02020900000000000000" charset="-128"/>
@@ -4441,7 +4391,12 @@
               <a:t> </a:t>
             </a:r>
             <a:r>
-              <a:rPr lang="ja-JP" altLang="en-US" sz="2800">
+              <a:rPr lang="ja-JP" altLang="en-US" sz="2800" dirty="0">
+                <a:solidFill>
+                  <a:schemeClr val="accent1">
+                    <a:lumMod val="50000"/>
+                  </a:schemeClr>
+                </a:solidFill>
                 <a:latin typeface="FOT-Popハッピネス Std EB" panose="02020900000000000000" charset="-128"/>
                 <a:ea typeface="FOT-Popハッピネス Std EB" panose="02020900000000000000" charset="-128"/>
                 <a:cs typeface="FOT-Popハッピネス Std EB" panose="02020900000000000000" charset="-128"/>
@@ -4449,7 +4404,7 @@
               <a:t>左移動</a:t>
             </a:r>
             <a:r>
-              <a:rPr lang="en-US" altLang="ja-JP" sz="2800">
+              <a:rPr lang="en-US" altLang="ja-JP" sz="2800" dirty="0">
                 <a:latin typeface="FOT-Popハッピネス Std EB" panose="02020900000000000000" charset="-128"/>
                 <a:ea typeface="FOT-Popハッピネス Std EB" panose="02020900000000000000" charset="-128"/>
                 <a:cs typeface="FOT-Popハッピネス Std EB" panose="02020900000000000000" charset="-128"/>
@@ -4457,7 +4412,7 @@
               <a:t>		</a:t>
             </a:r>
             <a:r>
-              <a:rPr lang="en-US" altLang="ja-JP" sz="2800">
+              <a:rPr lang="en-US" altLang="ja-JP" sz="2800" dirty="0">
                 <a:solidFill>
                   <a:srgbClr val="0070C0"/>
                 </a:solidFill>
@@ -4469,7 +4424,7 @@
               <a:t>O</a:t>
             </a:r>
             <a:r>
-              <a:rPr lang="en-US" altLang="ja-JP" sz="2800">
+              <a:rPr lang="en-US" altLang="ja-JP" sz="2800" dirty="0">
                 <a:latin typeface="FOT-Popハッピネス Std EB" panose="02020900000000000000" charset="-128"/>
                 <a:ea typeface="FOT-Popハッピネス Std EB" panose="02020900000000000000" charset="-128"/>
                 <a:cs typeface="FOT-Popハッピネス Std EB" panose="02020900000000000000" charset="-128"/>
@@ -4478,7 +4433,12 @@
               <a:t> </a:t>
             </a:r>
             <a:r>
-              <a:rPr lang="ja-JP" altLang="en-US" sz="2800">
+              <a:rPr lang="ja-JP" altLang="en-US" sz="2800" dirty="0">
+                <a:solidFill>
+                  <a:schemeClr val="accent1">
+                    <a:lumMod val="50000"/>
+                  </a:schemeClr>
+                </a:solidFill>
                 <a:latin typeface="FOT-Popハッピネス Std EB" panose="02020900000000000000" charset="-128"/>
                 <a:ea typeface="FOT-Popハッピネス Std EB" panose="02020900000000000000" charset="-128"/>
                 <a:cs typeface="FOT-Popハッピネス Std EB" panose="02020900000000000000" charset="-128"/>
@@ -4486,7 +4446,12 @@
               </a:rPr>
               <a:t>ズームアウト</a:t>
             </a:r>
-            <a:endParaRPr lang="en-US" altLang="ja-JP" sz="2800">
+            <a:endParaRPr lang="en-US" altLang="ja-JP" sz="2800" dirty="0">
+              <a:solidFill>
+                <a:schemeClr val="accent1">
+                  <a:lumMod val="50000"/>
+                </a:schemeClr>
+              </a:solidFill>
               <a:latin typeface="FOT-Popハッピネス Std EB" panose="02020900000000000000" charset="-128"/>
               <a:ea typeface="FOT-Popハッピネス Std EB" panose="02020900000000000000" charset="-128"/>
               <a:cs typeface="FOT-Popハッピネス Std EB" panose="02020900000000000000" charset="-128"/>
@@ -4494,7 +4459,7 @@
           </a:p>
           <a:p>
             <a:r>
-              <a:rPr lang="en-US" altLang="ja-JP" sz="2800">
+              <a:rPr lang="en-US" altLang="ja-JP" sz="2800" dirty="0">
                 <a:solidFill>
                   <a:srgbClr val="FF0000"/>
                 </a:solidFill>
@@ -4505,7 +4470,7 @@
               <a:t>			D</a:t>
             </a:r>
             <a:r>
-              <a:rPr lang="en-US" altLang="ja-JP" sz="2800">
+              <a:rPr lang="en-US" altLang="ja-JP" sz="2800" dirty="0">
                 <a:latin typeface="FOT-Popハッピネス Std EB" panose="02020900000000000000" charset="-128"/>
                 <a:ea typeface="FOT-Popハッピネス Std EB" panose="02020900000000000000" charset="-128"/>
                 <a:cs typeface="FOT-Popハッピネス Std EB" panose="02020900000000000000" charset="-128"/>
@@ -4513,29 +4478,29 @@
               <a:t> </a:t>
             </a:r>
             <a:r>
-              <a:rPr lang="ja-JP" altLang="en-US" sz="2800">
+              <a:rPr lang="ja-JP" altLang="en-US" sz="2800" dirty="0">
+                <a:solidFill>
+                  <a:schemeClr val="accent1">
+                    <a:lumMod val="50000"/>
+                  </a:schemeClr>
+                </a:solidFill>
                 <a:latin typeface="FOT-Popハッピネス Std EB" panose="02020900000000000000" charset="-128"/>
                 <a:ea typeface="FOT-Popハッピネス Std EB" panose="02020900000000000000" charset="-128"/>
                 <a:cs typeface="FOT-Popハッピネス Std EB" panose="02020900000000000000" charset="-128"/>
               </a:rPr>
               <a:t>右移動</a:t>
             </a:r>
-            <a:endParaRPr lang="ja-JP" altLang="en-US" sz="2800">
+          </a:p>
+          <a:p>
+            <a:endParaRPr lang="ja-JP" altLang="en-US" sz="2800" dirty="0">
               <a:latin typeface="FOT-Popハッピネス Std EB" panose="02020900000000000000" charset="-128"/>
               <a:ea typeface="FOT-Popハッピネス Std EB" panose="02020900000000000000" charset="-128"/>
               <a:cs typeface="FOT-Popハッピネス Std EB" panose="02020900000000000000" charset="-128"/>
             </a:endParaRPr>
           </a:p>
           <a:p>
-            <a:endParaRPr lang="ja-JP" altLang="en-US" sz="2800">
-              <a:latin typeface="FOT-Popハッピネス Std EB" panose="02020900000000000000" charset="-128"/>
-              <a:ea typeface="FOT-Popハッピネス Std EB" panose="02020900000000000000" charset="-128"/>
-              <a:cs typeface="FOT-Popハッピネス Std EB" panose="02020900000000000000" charset="-128"/>
-            </a:endParaRPr>
-          </a:p>
-          <a:p>
-            <a:r>
-              <a:rPr lang="en-US" altLang="ja-JP" sz="2800">
+            <a:r>
+              <a:rPr lang="en-US" altLang="ja-JP" sz="2800" dirty="0">
                 <a:solidFill>
                   <a:srgbClr val="00B050"/>
                 </a:solidFill>
@@ -4547,7 +4512,7 @@
               <a:t>J</a:t>
             </a:r>
             <a:r>
-              <a:rPr lang="en-US" altLang="ja-JP" sz="2800">
+              <a:rPr lang="en-US" altLang="ja-JP" sz="2800" dirty="0">
                 <a:latin typeface="FOT-Popハッピネス Std EB" panose="02020900000000000000" charset="-128"/>
                 <a:ea typeface="FOT-Popハッピネス Std EB" panose="02020900000000000000" charset="-128"/>
                 <a:cs typeface="FOT-Popハッピネス Std EB" panose="02020900000000000000" charset="-128"/>
@@ -4556,7 +4521,12 @@
               <a:t> </a:t>
             </a:r>
             <a:r>
-              <a:rPr lang="ja-JP" altLang="en-US" sz="2800">
+              <a:rPr lang="ja-JP" altLang="en-US" sz="2800" dirty="0">
+                <a:solidFill>
+                  <a:schemeClr val="accent1">
+                    <a:lumMod val="50000"/>
+                  </a:schemeClr>
+                </a:solidFill>
                 <a:latin typeface="FOT-Popハッピネス Std EB" panose="02020900000000000000" charset="-128"/>
                 <a:ea typeface="FOT-Popハッピネス Std EB" panose="02020900000000000000" charset="-128"/>
                 <a:cs typeface="FOT-Popハッピネス Std EB" panose="02020900000000000000" charset="-128"/>
@@ -4565,7 +4535,12 @@
               <a:t>アクション</a:t>
             </a:r>
             <a:r>
-              <a:rPr lang="en-US" altLang="ja-JP" sz="2800">
+              <a:rPr lang="en-US" altLang="ja-JP" sz="2800" dirty="0">
+                <a:solidFill>
+                  <a:schemeClr val="accent1">
+                    <a:lumMod val="50000"/>
+                  </a:schemeClr>
+                </a:solidFill>
                 <a:latin typeface="FOT-Popハッピネス Std EB" panose="02020900000000000000" charset="-128"/>
                 <a:ea typeface="FOT-Popハッピネス Std EB" panose="02020900000000000000" charset="-128"/>
                 <a:cs typeface="FOT-Popハッピネス Std EB" panose="02020900000000000000" charset="-128"/>
@@ -4574,7 +4549,12 @@
               <a:t>	</a:t>
             </a:r>
             <a:r>
-              <a:rPr lang="ja-JP" altLang="en-US" sz="2800">
+              <a:rPr lang="ja-JP" altLang="en-US" sz="2800" dirty="0">
+                <a:solidFill>
+                  <a:schemeClr val="accent1">
+                    <a:lumMod val="50000"/>
+                  </a:schemeClr>
+                </a:solidFill>
                 <a:latin typeface="FOT-Popハッピネス Std EB" panose="02020900000000000000" charset="-128"/>
                 <a:ea typeface="FOT-Popハッピネス Std EB" panose="02020900000000000000" charset="-128"/>
                 <a:cs typeface="FOT-Popハッピネス Std EB" panose="02020900000000000000" charset="-128"/>
@@ -4582,16 +4562,10 @@
               </a:rPr>
               <a:t>レバーなどのギミックを起動する</a:t>
             </a:r>
-            <a:endParaRPr lang="ja-JP" altLang="en-US" sz="2800">
-              <a:latin typeface="FOT-Popハッピネス Std EB" panose="02020900000000000000" charset="-128"/>
-              <a:ea typeface="FOT-Popハッピネス Std EB" panose="02020900000000000000" charset="-128"/>
-              <a:cs typeface="FOT-Popハッピネス Std EB" panose="02020900000000000000" charset="-128"/>
-              <a:sym typeface="+mn-ea"/>
-            </a:endParaRPr>
-          </a:p>
-          <a:p>
-            <a:r>
-              <a:rPr lang="en-US" altLang="ja-JP" sz="2800">
+          </a:p>
+          <a:p>
+            <a:r>
+              <a:rPr lang="en-US" altLang="ja-JP" sz="2800" dirty="0" err="1">
                 <a:solidFill>
                   <a:srgbClr val="00B050"/>
                 </a:solidFill>
@@ -4603,7 +4577,7 @@
               <a:t>Spc</a:t>
             </a:r>
             <a:r>
-              <a:rPr lang="en-US" altLang="ja-JP" sz="2800">
+              <a:rPr lang="en-US" altLang="ja-JP" sz="2800" dirty="0">
                 <a:solidFill>
                   <a:schemeClr val="tx1"/>
                 </a:solidFill>
@@ -4615,9 +4589,11 @@
               <a:t> </a:t>
             </a:r>
             <a:r>
-              <a:rPr lang="ja-JP" altLang="en-US" sz="2800">
-                <a:solidFill>
-                  <a:schemeClr val="tx1"/>
+              <a:rPr lang="ja-JP" altLang="en-US" sz="2800" dirty="0">
+                <a:solidFill>
+                  <a:schemeClr val="accent1">
+                    <a:lumMod val="50000"/>
+                  </a:schemeClr>
                 </a:solidFill>
                 <a:latin typeface="FOT-Popハッピネス Std EB" panose="02020900000000000000" charset="-128"/>
                 <a:ea typeface="FOT-Popハッピネス Std EB" panose="02020900000000000000" charset="-128"/>
@@ -4627,9 +4603,11 @@
               <a:t>戻る</a:t>
             </a:r>
             <a:r>
-              <a:rPr lang="en-US" altLang="ja-JP" sz="2800">
-                <a:solidFill>
-                  <a:schemeClr val="tx1"/>
+              <a:rPr lang="en-US" altLang="ja-JP" sz="2800" dirty="0">
+                <a:solidFill>
+                  <a:schemeClr val="accent1">
+                    <a:lumMod val="50000"/>
+                  </a:schemeClr>
                 </a:solidFill>
                 <a:latin typeface="FOT-Popハッピネス Std EB" panose="02020900000000000000" charset="-128"/>
                 <a:ea typeface="FOT-Popハッピネス Std EB" panose="02020900000000000000" charset="-128"/>
@@ -4639,9 +4617,11 @@
               <a:t>	</a:t>
             </a:r>
             <a:r>
-              <a:rPr lang="ja-JP" altLang="en-US" sz="2800">
-                <a:solidFill>
-                  <a:schemeClr val="tx1"/>
+              <a:rPr lang="ja-JP" altLang="en-US" sz="2800" dirty="0">
+                <a:solidFill>
+                  <a:schemeClr val="accent1">
+                    <a:lumMod val="50000"/>
+                  </a:schemeClr>
                 </a:solidFill>
                 <a:latin typeface="FOT-Popハッピネス Std EB" panose="02020900000000000000" charset="-128"/>
                 <a:ea typeface="FOT-Popハッピネス Std EB" panose="02020900000000000000" charset="-128"/>
@@ -4650,15 +4630,6 @@
               </a:rPr>
               <a:t>チェックポイントに戻る</a:t>
             </a:r>
-            <a:endParaRPr lang="ja-JP" altLang="en-US" sz="2800">
-              <a:solidFill>
-                <a:schemeClr val="tx1"/>
-              </a:solidFill>
-              <a:latin typeface="FOT-Popハッピネス Std EB" panose="02020900000000000000" charset="-128"/>
-              <a:ea typeface="FOT-Popハッピネス Std EB" panose="02020900000000000000" charset="-128"/>
-              <a:cs typeface="FOT-Popハッピネス Std EB" panose="02020900000000000000" charset="-128"/>
-              <a:sym typeface="+mn-ea"/>
-            </a:endParaRPr>
           </a:p>
         </p:txBody>
       </p:sp>
@@ -4687,7 +4658,14 @@
         <p:cNvGrpSpPr/>
         <p:nvPr/>
       </p:nvGrpSpPr>
-      <p:grpSpPr/>
+      <p:grpSpPr>
+        <a:xfrm>
+          <a:off x="0" y="0"/>
+          <a:ext cx="0" cy="0"/>
+          <a:chOff x="0" y="0"/>
+          <a:chExt cx="0" cy="0"/>
+        </a:xfrm>
+      </p:grpSpPr>
       <p:sp>
         <p:nvSpPr>
           <p:cNvPr id="4" name="タイトル 1"/>
@@ -4729,13 +4707,23 @@
           <a:p>
             <a:pPr algn="ctr"/>
             <a:r>
-              <a:rPr lang="ja-JP" altLang="en-US" sz="4000">
+              <a:rPr lang="ja-JP" altLang="en-US" sz="4000" dirty="0">
+                <a:solidFill>
+                  <a:schemeClr val="accent1">
+                    <a:lumMod val="50000"/>
+                  </a:schemeClr>
+                </a:solidFill>
                 <a:latin typeface="FOT-Popハッピネス Std EB" panose="02020900000000000000" charset="-128"/>
                 <a:ea typeface="FOT-Popハッピネス Std EB" panose="02020900000000000000" charset="-128"/>
               </a:rPr>
               <a:t>特別感謝</a:t>
             </a:r>
-            <a:endParaRPr lang="en-US" altLang="ja-JP" sz="4000">
+            <a:endParaRPr lang="en-US" altLang="ja-JP" sz="4000" dirty="0">
+              <a:solidFill>
+                <a:schemeClr val="accent1">
+                  <a:lumMod val="50000"/>
+                </a:schemeClr>
+              </a:solidFill>
               <a:latin typeface="FOT-Popハッピネス Std EB" panose="02020900000000000000" charset="-128"/>
               <a:ea typeface="FOT-Popハッピネス Std EB" panose="02020900000000000000" charset="-128"/>
             </a:endParaRPr>
@@ -4762,9 +4750,10 @@
           <a:bodyPr wrap="square" rtlCol="0">
             <a:spAutoFit/>
           </a:bodyPr>
-          <a:p>
-            <a:r>
-              <a:rPr lang="ja-JP" altLang="en-US" sz="2800">
+          <a:lstStyle/>
+          <a:p>
+            <a:r>
+              <a:rPr lang="ja-JP" altLang="en-US" sz="2800" dirty="0">
                 <a:solidFill>
                   <a:srgbClr val="0070C0"/>
                 </a:solidFill>
@@ -4775,7 +4764,7 @@
               <a:t>制作期間</a:t>
             </a:r>
             <a:r>
-              <a:rPr lang="en-US" altLang="ja-JP" sz="2800">
+              <a:rPr lang="en-US" altLang="ja-JP" sz="2800" dirty="0">
                 <a:latin typeface="FOT-Popハッピネス Std EB" panose="02020900000000000000" charset="-128"/>
                 <a:ea typeface="FOT-Popハッピネス Std EB" panose="02020900000000000000" charset="-128"/>
                 <a:cs typeface="FOT-Popハッピネス Std EB" panose="02020900000000000000" charset="-128"/>
@@ -4783,11 +4772,10 @@
               <a:t>		</a:t>
             </a:r>
             <a:r>
-              <a:rPr lang="en-US" altLang="ja-JP" sz="2800">
-                <a:solidFill>
-                  <a:schemeClr val="tx1">
-                    <a:lumMod val="85000"/>
-                    <a:lumOff val="15000"/>
+              <a:rPr lang="en-US" altLang="ja-JP" sz="2800" dirty="0">
+                <a:solidFill>
+                  <a:schemeClr val="accent1">
+                    <a:lumMod val="50000"/>
                   </a:schemeClr>
                 </a:solidFill>
                 <a:latin typeface="FOT-Popハッピネス Std EB" panose="02020900000000000000" charset="-128"/>
@@ -4796,28 +4784,17 @@
               </a:rPr>
               <a:t>2023/9/13 ~ </a:t>
             </a:r>
-            <a:endParaRPr lang="en-US" altLang="ja-JP" sz="2800">
-              <a:solidFill>
-                <a:schemeClr val="tx1">
-                  <a:lumMod val="85000"/>
-                  <a:lumOff val="15000"/>
-                </a:schemeClr>
-              </a:solidFill>
+          </a:p>
+          <a:p>
+            <a:endParaRPr lang="ja-JP" altLang="en-US" sz="2800" dirty="0">
               <a:latin typeface="FOT-Popハッピネス Std EB" panose="02020900000000000000" charset="-128"/>
               <a:ea typeface="FOT-Popハッピネス Std EB" panose="02020900000000000000" charset="-128"/>
               <a:cs typeface="FOT-Popハッピネス Std EB" panose="02020900000000000000" charset="-128"/>
             </a:endParaRPr>
           </a:p>
           <a:p>
-            <a:endParaRPr lang="ja-JP" altLang="en-US" sz="2800">
-              <a:latin typeface="FOT-Popハッピネス Std EB" panose="02020900000000000000" charset="-128"/>
-              <a:ea typeface="FOT-Popハッピネス Std EB" panose="02020900000000000000" charset="-128"/>
-              <a:cs typeface="FOT-Popハッピネス Std EB" panose="02020900000000000000" charset="-128"/>
-            </a:endParaRPr>
-          </a:p>
-          <a:p>
-            <a:r>
-              <a:rPr lang="ja-JP" altLang="en-US" sz="2800">
+            <a:r>
+              <a:rPr lang="ja-JP" altLang="en-US" sz="2800" dirty="0">
                 <a:solidFill>
                   <a:schemeClr val="tx1">
                     <a:lumMod val="65000"/>
@@ -4831,7 +4808,7 @@
               <a:t>ゲームエンジン</a:t>
             </a:r>
             <a:r>
-              <a:rPr lang="en-US" altLang="ja-JP" sz="2800">
+              <a:rPr lang="en-US" altLang="ja-JP" sz="2800" dirty="0">
                 <a:solidFill>
                   <a:schemeClr val="tx1">
                     <a:lumMod val="65000"/>
@@ -4845,11 +4822,10 @@
               <a:t>	</a:t>
             </a:r>
             <a:r>
-              <a:rPr lang="en-US" altLang="ja-JP" sz="2800">
-                <a:solidFill>
-                  <a:schemeClr val="tx1">
-                    <a:lumMod val="85000"/>
-                    <a:lumOff val="15000"/>
+              <a:rPr lang="en-US" altLang="ja-JP" sz="2800" dirty="0">
+                <a:solidFill>
+                  <a:schemeClr val="accent1">
+                    <a:lumMod val="50000"/>
                   </a:schemeClr>
                 </a:solidFill>
                 <a:latin typeface="FOT-Popハッピネス Std EB" panose="02020900000000000000" charset="-128"/>
@@ -4858,14 +4834,9 @@
               </a:rPr>
               <a:t>Unity</a:t>
             </a:r>
-            <a:endParaRPr lang="en-US" altLang="ja-JP" sz="2800">
-              <a:latin typeface="FOT-Popハッピネス Std EB" panose="02020900000000000000" charset="-128"/>
-              <a:ea typeface="FOT-Popハッピネス Std EB" panose="02020900000000000000" charset="-128"/>
-              <a:cs typeface="FOT-Popハッピネス Std EB" panose="02020900000000000000" charset="-128"/>
-            </a:endParaRPr>
-          </a:p>
-          <a:p>
-            <a:endParaRPr lang="ja-JP" altLang="en-US" sz="2800">
+          </a:p>
+          <a:p>
+            <a:endParaRPr lang="ja-JP" altLang="en-US" sz="2800" dirty="0">
               <a:solidFill>
                 <a:srgbClr val="C00000"/>
               </a:solidFill>
@@ -4876,7 +4847,7 @@
           </a:p>
           <a:p>
             <a:r>
-              <a:rPr lang="ja-JP" altLang="en-US" sz="2800">
+              <a:rPr lang="ja-JP" altLang="en-US" sz="2800" dirty="0">
                 <a:solidFill>
                   <a:srgbClr val="C00000"/>
                 </a:solidFill>
@@ -4887,7 +4858,7 @@
               <a:t>使用ツール</a:t>
             </a:r>
             <a:r>
-              <a:rPr lang="en-US" altLang="ja-JP" sz="2800">
+              <a:rPr lang="en-US" altLang="ja-JP" sz="2800" dirty="0">
                 <a:solidFill>
                   <a:srgbClr val="C00000"/>
                 </a:solidFill>
@@ -4898,7 +4869,7 @@
               <a:t>	</a:t>
             </a:r>
             <a:r>
-              <a:rPr lang="en-US" altLang="ja-JP" sz="2800">
+              <a:rPr lang="en-US" altLang="ja-JP" sz="2800" dirty="0">
                 <a:latin typeface="FOT-Popハッピネス Std EB" panose="02020900000000000000" charset="-128"/>
                 <a:ea typeface="FOT-Popハッピネス Std EB" panose="02020900000000000000" charset="-128"/>
                 <a:cs typeface="FOT-Popハッピネス Std EB" panose="02020900000000000000" charset="-128"/>
@@ -4906,24 +4877,48 @@
               <a:t>	</a:t>
             </a:r>
             <a:r>
-              <a:rPr lang="en-US" altLang="ja-JP" sz="2800">
-                <a:solidFill>
-                  <a:schemeClr val="tx1">
-                    <a:lumMod val="85000"/>
-                    <a:lumOff val="15000"/>
+              <a:rPr lang="en-US" altLang="ja-JP" sz="2800" dirty="0" err="1">
+                <a:solidFill>
+                  <a:schemeClr val="accent1">
+                    <a:lumMod val="50000"/>
                   </a:schemeClr>
                 </a:solidFill>
                 <a:latin typeface="FOT-Popハッピネス Std EB" panose="02020900000000000000" charset="-128"/>
                 <a:ea typeface="FOT-Popハッピネス Std EB" panose="02020900000000000000" charset="-128"/>
                 <a:cs typeface="FOT-Popハッピネス Std EB" panose="02020900000000000000" charset="-128"/>
               </a:rPr>
-              <a:t>VSCode / Neovim</a:t>
-            </a:r>
-            <a:endParaRPr lang="en-US" altLang="ja-JP" sz="2800">
+              <a:t>VSCode</a:t>
+            </a:r>
+            <a:r>
+              <a:rPr lang="en-US" altLang="ja-JP" sz="2800" dirty="0">
+                <a:solidFill>
+                  <a:schemeClr val="accent1">
+                    <a:lumMod val="50000"/>
+                  </a:schemeClr>
+                </a:solidFill>
+                <a:latin typeface="FOT-Popハッピネス Std EB" panose="02020900000000000000" charset="-128"/>
+                <a:ea typeface="FOT-Popハッピネス Std EB" panose="02020900000000000000" charset="-128"/>
+                <a:cs typeface="FOT-Popハッピネス Std EB" panose="02020900000000000000" charset="-128"/>
+              </a:rPr>
+              <a:t> / </a:t>
+            </a:r>
+            <a:r>
+              <a:rPr lang="en-US" altLang="ja-JP" sz="2800" dirty="0" err="1">
+                <a:solidFill>
+                  <a:schemeClr val="accent1">
+                    <a:lumMod val="50000"/>
+                  </a:schemeClr>
+                </a:solidFill>
+                <a:latin typeface="FOT-Popハッピネス Std EB" panose="02020900000000000000" charset="-128"/>
+                <a:ea typeface="FOT-Popハッピネス Std EB" panose="02020900000000000000" charset="-128"/>
+                <a:cs typeface="FOT-Popハッピネス Std EB" panose="02020900000000000000" charset="-128"/>
+              </a:rPr>
+              <a:t>Neovim</a:t>
+            </a:r>
+            <a:endParaRPr lang="en-US" altLang="ja-JP" sz="2800" dirty="0">
               <a:solidFill>
-                <a:schemeClr val="tx1">
-                  <a:lumMod val="85000"/>
-                  <a:lumOff val="15000"/>
+                <a:schemeClr val="accent1">
+                  <a:lumMod val="50000"/>
                 </a:schemeClr>
               </a:solidFill>
               <a:latin typeface="FOT-Popハッピネス Std EB" panose="02020900000000000000" charset="-128"/>
@@ -4933,11 +4928,10 @@
           </a:p>
           <a:p>
             <a:r>
-              <a:rPr lang="en-US" altLang="ja-JP" sz="2800">
-                <a:solidFill>
-                  <a:schemeClr val="tx1">
-                    <a:lumMod val="85000"/>
-                    <a:lumOff val="15000"/>
+              <a:rPr lang="en-US" altLang="ja-JP" sz="2800" dirty="0">
+                <a:solidFill>
+                  <a:schemeClr val="accent1">
+                    <a:lumMod val="50000"/>
                   </a:schemeClr>
                 </a:solidFill>
                 <a:latin typeface="FOT-Popハッピネス Std EB" panose="02020900000000000000" charset="-128"/>
@@ -4946,25 +4940,13 @@
               </a:rPr>
               <a:t>			GIMP</a:t>
             </a:r>
-            <a:endParaRPr lang="en-US" altLang="ja-JP" sz="2800">
-              <a:solidFill>
-                <a:schemeClr val="tx1">
-                  <a:lumMod val="85000"/>
-                  <a:lumOff val="15000"/>
-                </a:schemeClr>
-              </a:solidFill>
-              <a:latin typeface="FOT-Popハッピネス Std EB" panose="02020900000000000000" charset="-128"/>
-              <a:ea typeface="FOT-Popハッピネス Std EB" panose="02020900000000000000" charset="-128"/>
-              <a:cs typeface="FOT-Popハッピネス Std EB" panose="02020900000000000000" charset="-128"/>
-            </a:endParaRPr>
-          </a:p>
-          <a:p>
-            <a:r>
-              <a:rPr lang="en-US" altLang="ja-JP" sz="2800">
-                <a:solidFill>
-                  <a:schemeClr val="tx1">
-                    <a:lumMod val="85000"/>
-                    <a:lumOff val="15000"/>
+          </a:p>
+          <a:p>
+            <a:r>
+              <a:rPr lang="en-US" altLang="ja-JP" sz="2800" dirty="0">
+                <a:solidFill>
+                  <a:schemeClr val="accent1">
+                    <a:lumMod val="50000"/>
                   </a:schemeClr>
                 </a:solidFill>
                 <a:latin typeface="FOT-Popハッピネス Std EB" panose="02020900000000000000" charset="-128"/>
@@ -4973,25 +4955,13 @@
               </a:rPr>
               <a:t>			Git</a:t>
             </a:r>
-            <a:endParaRPr lang="en-US" altLang="ja-JP" sz="2800">
-              <a:solidFill>
-                <a:schemeClr val="tx1">
-                  <a:lumMod val="85000"/>
-                  <a:lumOff val="15000"/>
-                </a:schemeClr>
-              </a:solidFill>
-              <a:latin typeface="FOT-Popハッピネス Std EB" panose="02020900000000000000" charset="-128"/>
-              <a:ea typeface="FOT-Popハッピネス Std EB" panose="02020900000000000000" charset="-128"/>
-              <a:cs typeface="FOT-Popハッピネス Std EB" panose="02020900000000000000" charset="-128"/>
-            </a:endParaRPr>
-          </a:p>
-          <a:p>
-            <a:r>
-              <a:rPr lang="en-US" altLang="ja-JP" sz="2800">
-                <a:solidFill>
-                  <a:schemeClr val="tx1">
-                    <a:lumMod val="85000"/>
-                    <a:lumOff val="15000"/>
+          </a:p>
+          <a:p>
+            <a:r>
+              <a:rPr lang="en-US" altLang="ja-JP" sz="2800" dirty="0">
+                <a:solidFill>
+                  <a:schemeClr val="accent1">
+                    <a:lumMod val="50000"/>
                   </a:schemeClr>
                 </a:solidFill>
                 <a:latin typeface="FOT-Popハッピネス Std EB" panose="02020900000000000000" charset="-128"/>
@@ -5000,25 +4970,13 @@
               </a:rPr>
               <a:t>			Google Bard</a:t>
             </a:r>
-            <a:endParaRPr lang="en-US" altLang="ja-JP" sz="2800">
-              <a:solidFill>
-                <a:schemeClr val="tx1">
-                  <a:lumMod val="85000"/>
-                  <a:lumOff val="15000"/>
-                </a:schemeClr>
-              </a:solidFill>
-              <a:latin typeface="FOT-Popハッピネス Std EB" panose="02020900000000000000" charset="-128"/>
-              <a:ea typeface="FOT-Popハッピネス Std EB" panose="02020900000000000000" charset="-128"/>
-              <a:cs typeface="FOT-Popハッピネス Std EB" panose="02020900000000000000" charset="-128"/>
-            </a:endParaRPr>
-          </a:p>
-          <a:p>
-            <a:r>
-              <a:rPr lang="en-US" altLang="ja-JP" sz="2800">
-                <a:solidFill>
-                  <a:schemeClr val="tx1">
-                    <a:lumMod val="85000"/>
-                    <a:lumOff val="15000"/>
+          </a:p>
+          <a:p>
+            <a:r>
+              <a:rPr lang="en-US" altLang="ja-JP" sz="2800" dirty="0">
+                <a:solidFill>
+                  <a:schemeClr val="accent1">
+                    <a:lumMod val="50000"/>
                   </a:schemeClr>
                 </a:solidFill>
                 <a:latin typeface="FOT-Popハッピネス Std EB" panose="02020900000000000000" charset="-128"/>
@@ -5027,17 +4985,6 @@
               </a:rPr>
               <a:t>			Notion</a:t>
             </a:r>
-            <a:endParaRPr lang="en-US" altLang="ja-JP" sz="2800">
-              <a:solidFill>
-                <a:schemeClr val="tx1">
-                  <a:lumMod val="85000"/>
-                  <a:lumOff val="15000"/>
-                </a:schemeClr>
-              </a:solidFill>
-              <a:latin typeface="FOT-Popハッピネス Std EB" panose="02020900000000000000" charset="-128"/>
-              <a:ea typeface="FOT-Popハッピネス Std EB" panose="02020900000000000000" charset="-128"/>
-              <a:cs typeface="FOT-Popハッピネス Std EB" panose="02020900000000000000" charset="-128"/>
-            </a:endParaRPr>
           </a:p>
         </p:txBody>
       </p:sp>
@@ -5300,6 +5247,8 @@
       </a:bgFillStyleLst>
     </a:fmtScheme>
   </a:themeElements>
+  <a:objectDefaults/>
+  <a:extraClrSchemeLst/>
   <a:extLst>
     <a:ext uri="{05A4C25C-085E-4340-85A3-A5531E510DB2}">
       <thm15:themeFamily xmlns:thm15="http://schemas.microsoft.com/office/thememl/2012/main" name="Office Theme" id="{62F939B6-93AF-4DB8-9C6B-D6C7DFDC589F}" vid="{4A3C46E8-61CC-4603-A589-7422A47A8E4A}"/>
@@ -5559,6 +5508,8 @@
       </a:bgFillStyleLst>
     </a:fmtScheme>
   </a:themeElements>
+  <a:objectDefaults/>
+  <a:extraClrSchemeLst/>
   <a:extLst>
     <a:ext uri="{05A4C25C-085E-4340-85A3-A5531E510DB2}">
       <thm15:themeFamily xmlns:thm15="http://schemas.microsoft.com/office/thememl/2012/main" name="Office Theme" id="{62F939B6-93AF-4DB8-9C6B-D6C7DFDC589F}" vid="{4A3C46E8-61CC-4603-A589-7422A47A8E4A}"/>
@@ -5818,6 +5769,8 @@
       </a:bgFillStyleLst>
     </a:fmtScheme>
   </a:themeElements>
+  <a:objectDefaults/>
+  <a:extraClrSchemeLst/>
   <a:extLst>
     <a:ext uri="{05A4C25C-085E-4340-85A3-A5531E510DB2}">
       <thm15:themeFamily xmlns:thm15="http://schemas.microsoft.com/office/thememl/2012/main" name="Office Theme" id="{62F939B6-93AF-4DB8-9C6B-D6C7DFDC589F}" vid="{4A3C46E8-61CC-4603-A589-7422A47A8E4A}"/>

</xml_diff>